<commit_message>
Fix about me page error.
</commit_message>
<xml_diff>
--- a/EDU GRAPH-API Demo Script.pptx
+++ b/EDU GRAPH-API Demo Script.pptx
@@ -7,10 +7,10 @@
     <p:sldMasterId id="2147484307" r:id="rId6"/>
   </p:sldMasterIdLst>
   <p:notesMasterIdLst>
-    <p:notesMasterId r:id="rId51"/>
+    <p:notesMasterId r:id="rId52"/>
   </p:notesMasterIdLst>
   <p:handoutMasterIdLst>
-    <p:handoutMasterId r:id="rId52"/>
+    <p:handoutMasterId r:id="rId53"/>
   </p:handoutMasterIdLst>
   <p:sldIdLst>
     <p:sldId id="258" r:id="rId7"/>
@@ -25,38 +25,39 @@
     <p:sldId id="305" r:id="rId16"/>
     <p:sldId id="337" r:id="rId17"/>
     <p:sldId id="306" r:id="rId18"/>
-    <p:sldId id="352" r:id="rId19"/>
-    <p:sldId id="307" r:id="rId20"/>
-    <p:sldId id="334" r:id="rId21"/>
-    <p:sldId id="336" r:id="rId22"/>
-    <p:sldId id="308" r:id="rId23"/>
-    <p:sldId id="309" r:id="rId24"/>
-    <p:sldId id="311" r:id="rId25"/>
-    <p:sldId id="338" r:id="rId26"/>
-    <p:sldId id="339" r:id="rId27"/>
-    <p:sldId id="353" r:id="rId28"/>
-    <p:sldId id="312" r:id="rId29"/>
-    <p:sldId id="333" r:id="rId30"/>
-    <p:sldId id="313" r:id="rId31"/>
-    <p:sldId id="314" r:id="rId32"/>
-    <p:sldId id="315" r:id="rId33"/>
-    <p:sldId id="316" r:id="rId34"/>
-    <p:sldId id="340" r:id="rId35"/>
-    <p:sldId id="341" r:id="rId36"/>
-    <p:sldId id="354" r:id="rId37"/>
-    <p:sldId id="317" r:id="rId38"/>
-    <p:sldId id="318" r:id="rId39"/>
-    <p:sldId id="319" r:id="rId40"/>
-    <p:sldId id="320" r:id="rId41"/>
-    <p:sldId id="321" r:id="rId42"/>
-    <p:sldId id="322" r:id="rId43"/>
-    <p:sldId id="323" r:id="rId44"/>
-    <p:sldId id="342" r:id="rId45"/>
-    <p:sldId id="343" r:id="rId46"/>
-    <p:sldId id="349" r:id="rId47"/>
-    <p:sldId id="350" r:id="rId48"/>
-    <p:sldId id="347" r:id="rId49"/>
-    <p:sldId id="348" r:id="rId50"/>
+    <p:sldId id="355" r:id="rId19"/>
+    <p:sldId id="352" r:id="rId20"/>
+    <p:sldId id="307" r:id="rId21"/>
+    <p:sldId id="334" r:id="rId22"/>
+    <p:sldId id="336" r:id="rId23"/>
+    <p:sldId id="308" r:id="rId24"/>
+    <p:sldId id="309" r:id="rId25"/>
+    <p:sldId id="311" r:id="rId26"/>
+    <p:sldId id="338" r:id="rId27"/>
+    <p:sldId id="339" r:id="rId28"/>
+    <p:sldId id="353" r:id="rId29"/>
+    <p:sldId id="312" r:id="rId30"/>
+    <p:sldId id="333" r:id="rId31"/>
+    <p:sldId id="313" r:id="rId32"/>
+    <p:sldId id="314" r:id="rId33"/>
+    <p:sldId id="315" r:id="rId34"/>
+    <p:sldId id="316" r:id="rId35"/>
+    <p:sldId id="340" r:id="rId36"/>
+    <p:sldId id="341" r:id="rId37"/>
+    <p:sldId id="354" r:id="rId38"/>
+    <p:sldId id="317" r:id="rId39"/>
+    <p:sldId id="318" r:id="rId40"/>
+    <p:sldId id="319" r:id="rId41"/>
+    <p:sldId id="320" r:id="rId42"/>
+    <p:sldId id="321" r:id="rId43"/>
+    <p:sldId id="322" r:id="rId44"/>
+    <p:sldId id="323" r:id="rId45"/>
+    <p:sldId id="342" r:id="rId46"/>
+    <p:sldId id="343" r:id="rId47"/>
+    <p:sldId id="349" r:id="rId48"/>
+    <p:sldId id="350" r:id="rId49"/>
+    <p:sldId id="347" r:id="rId50"/>
+    <p:sldId id="348" r:id="rId51"/>
   </p:sldIdLst>
   <p:sldSz cx="12436475" cy="6994525"/>
   <p:notesSz cx="6858000" cy="9144000"/>
@@ -176,6 +177,7 @@
             <p14:sldId id="305"/>
             <p14:sldId id="337"/>
             <p14:sldId id="306"/>
+            <p14:sldId id="355"/>
             <p14:sldId id="352"/>
           </p14:sldIdLst>
         </p14:section>
@@ -267,6 +269,10 @@
 </p:cmAuthorLst>
 </file>
 
+<file path=ppt/revisionInfo.xml><?xml version="1.0" encoding="utf-8"?>
+<p1510:revInfo xmlns:a="http://schemas.openxmlformats.org/drawingml/2006/main" xmlns:r="http://schemas.openxmlformats.org/officeDocument/2006/relationships" xmlns:p1510="http://schemas.microsoft.com/office/powerpoint/2015/10/main"/>
+</file>
+
 <file path=ppt/handoutMasters/handoutMaster1.xml><?xml version="1.0" encoding="utf-8"?>
 <p:handoutMaster xmlns:a="http://schemas.openxmlformats.org/drawingml/2006/main" xmlns:r="http://schemas.openxmlformats.org/officeDocument/2006/relationships" xmlns:p="http://schemas.openxmlformats.org/presentationml/2006/main">
   <p:cSld>
@@ -356,7 +362,7 @@
               <a:rPr lang="en-US" smtClean="0">
                 <a:latin typeface="Segoe UI" pitchFamily="34" charset="0"/>
               </a:rPr>
-              <a:t>3/3/2017 2:52 PM</a:t>
+              <a:t>8/7/2017 9:05 AM</a:t>
             </a:fld>
             <a:endParaRPr lang="en-US" dirty="0">
               <a:latin typeface="Segoe UI" pitchFamily="34" charset="0"/>
@@ -639,7 +645,7 @@
           <a:p>
             <a:fld id="{38EEC551-8CDA-4EB6-89BB-2A86C9F091C8}" type="datetime8">
               <a:rPr lang="en-US" smtClean="0"/>
-              <a:t>3/3/2017 2:52 PM</a:t>
+              <a:t>8/7/2017 9:05 AM</a:t>
             </a:fld>
             <a:endParaRPr lang="en-US" dirty="0"/>
           </a:p>
@@ -1003,7 +1009,7 @@
           <a:p>
             <a:fld id="{C6996B83-60CF-42A8-BA06-F99D0BEC30B3}" type="datetime1">
               <a:rPr lang="en-US" smtClean="0"/>
-              <a:t>3/3/2017</a:t>
+              <a:t>8/7/2017</a:t>
             </a:fld>
             <a:endParaRPr lang="en-US" dirty="0"/>
           </a:p>
@@ -1223,7 +1229,7 @@
                 </a:solidFill>
               </a:rPr>
               <a:pPr/>
-              <a:t>3/3/2017</a:t>
+              <a:t>8/7/2017</a:t>
             </a:fld>
             <a:endParaRPr lang="en-US" dirty="0">
               <a:solidFill>
@@ -1433,7 +1439,7 @@
                 </a:solidFill>
               </a:rPr>
               <a:pPr/>
-              <a:t>3/3/2017</a:t>
+              <a:t>8/7/2017</a:t>
             </a:fld>
             <a:endParaRPr lang="en-US" dirty="0">
               <a:solidFill>
@@ -1489,6 +1495,216 @@
 </file>
 
 <file path=ppt/notesSlides/notesSlide12.xml><?xml version="1.0" encoding="utf-8"?>
+<p:notes xmlns:a="http://schemas.openxmlformats.org/drawingml/2006/main" xmlns:r="http://schemas.openxmlformats.org/officeDocument/2006/relationships" xmlns:p="http://schemas.openxmlformats.org/presentationml/2006/main">
+  <p:cSld>
+    <p:spTree>
+      <p:nvGrpSpPr>
+        <p:cNvPr id="1" name=""/>
+        <p:cNvGrpSpPr/>
+        <p:nvPr/>
+      </p:nvGrpSpPr>
+      <p:grpSpPr>
+        <a:xfrm>
+          <a:off x="0" y="0"/>
+          <a:ext cx="0" cy="0"/>
+          <a:chOff x="0" y="0"/>
+          <a:chExt cx="0" cy="0"/>
+        </a:xfrm>
+      </p:grpSpPr>
+      <p:sp>
+        <p:nvSpPr>
+          <p:cNvPr id="2" name="Slide Image Placeholder 1"/>
+          <p:cNvSpPr>
+            <a:spLocks noGrp="1" noRot="1" noChangeAspect="1"/>
+          </p:cNvSpPr>
+          <p:nvPr>
+            <p:ph type="sldImg"/>
+          </p:nvPr>
+        </p:nvSpPr>
+        <p:spPr/>
+      </p:sp>
+      <p:sp>
+        <p:nvSpPr>
+          <p:cNvPr id="3" name="Notes Placeholder 2"/>
+          <p:cNvSpPr>
+            <a:spLocks noGrp="1"/>
+          </p:cNvSpPr>
+          <p:nvPr>
+            <p:ph type="body" idx="1"/>
+          </p:nvPr>
+        </p:nvSpPr>
+        <p:spPr/>
+        <p:txBody>
+          <a:bodyPr/>
+          <a:lstStyle/>
+          <a:p>
+            <a:endParaRPr lang="en-US"/>
+          </a:p>
+        </p:txBody>
+      </p:sp>
+      <p:sp>
+        <p:nvSpPr>
+          <p:cNvPr id="4" name="Header Placeholder 3"/>
+          <p:cNvSpPr>
+            <a:spLocks noGrp="1"/>
+          </p:cNvSpPr>
+          <p:nvPr>
+            <p:ph type="hdr" sz="quarter" idx="10"/>
+          </p:nvPr>
+        </p:nvSpPr>
+        <p:spPr/>
+        <p:txBody>
+          <a:bodyPr/>
+          <a:lstStyle/>
+          <a:p>
+            <a:r>
+              <a:rPr lang="en-US">
+                <a:solidFill>
+                  <a:prstClr val="black"/>
+                </a:solidFill>
+              </a:rPr>
+              <a:t>Build 2014</a:t>
+            </a:r>
+            <a:endParaRPr lang="en-US" dirty="0">
+              <a:solidFill>
+                <a:prstClr val="black"/>
+              </a:solidFill>
+            </a:endParaRPr>
+          </a:p>
+        </p:txBody>
+      </p:sp>
+      <p:sp>
+        <p:nvSpPr>
+          <p:cNvPr id="5" name="Footer Placeholder 4"/>
+          <p:cNvSpPr>
+            <a:spLocks noGrp="1"/>
+          </p:cNvSpPr>
+          <p:nvPr>
+            <p:ph type="ftr" sz="quarter" idx="11"/>
+          </p:nvPr>
+        </p:nvSpPr>
+        <p:spPr/>
+        <p:txBody>
+          <a:bodyPr/>
+          <a:lstStyle/>
+          <a:p>
+            <a:pPr defTabSz="914099" eaLnBrk="0" hangingPunct="0"/>
+            <a:r>
+              <a:rPr lang="en-US" sz="400">
+                <a:gradFill>
+                  <a:gsLst>
+                    <a:gs pos="0">
+                      <a:prstClr val="black"/>
+                    </a:gs>
+                    <a:gs pos="100000">
+                      <a:prstClr val="black"/>
+                    </a:gs>
+                  </a:gsLst>
+                  <a:lin ang="5400000" scaled="0"/>
+                </a:gradFill>
+                <a:latin typeface="Segoe UI" pitchFamily="34" charset="0"/>
+                <a:ea typeface="Segoe UI" pitchFamily="34" charset="0"/>
+                <a:cs typeface="Segoe UI" pitchFamily="34" charset="0"/>
+              </a:rPr>
+              <a:t>© 2014 Microsoft Corporation. All rights reserved. Microsoft, Windows, and other product names are or may be registered trademarks and/or trademarks in the U.S. and/or other countries. The information herein is for informational purposes only and represents the current view of Microsoft Corporation as of the date of this presentation.  Because Microsoft must respond to changing market conditions, it should not be interpreted to be a commitment on the part of Microsoft, and Microsoft cannot guarantee the accuracy of any information provided after the date of this presentation.  MICROSOFT MAKES NO WARRANTIES, EXPRESS, IMPLIED OR STATUTORY, AS TO THE INFORMATION IN THIS PRESENTATION.</a:t>
+            </a:r>
+            <a:endParaRPr lang="en-US" sz="400" dirty="0">
+              <a:gradFill>
+                <a:gsLst>
+                  <a:gs pos="0">
+                    <a:prstClr val="black"/>
+                  </a:gs>
+                  <a:gs pos="100000">
+                    <a:prstClr val="black"/>
+                  </a:gs>
+                </a:gsLst>
+                <a:lin ang="5400000" scaled="0"/>
+              </a:gradFill>
+              <a:latin typeface="Segoe UI" pitchFamily="34" charset="0"/>
+              <a:ea typeface="Segoe UI" pitchFamily="34" charset="0"/>
+              <a:cs typeface="Segoe UI" pitchFamily="34" charset="0"/>
+            </a:endParaRPr>
+          </a:p>
+        </p:txBody>
+      </p:sp>
+      <p:sp>
+        <p:nvSpPr>
+          <p:cNvPr id="6" name="Date Placeholder 5"/>
+          <p:cNvSpPr>
+            <a:spLocks noGrp="1"/>
+          </p:cNvSpPr>
+          <p:nvPr>
+            <p:ph type="dt" idx="12"/>
+          </p:nvPr>
+        </p:nvSpPr>
+        <p:spPr/>
+        <p:txBody>
+          <a:bodyPr/>
+          <a:lstStyle/>
+          <a:p>
+            <a:fld id="{9F00D60D-1703-4D24-8308-FEE06A50A69C}" type="datetime1">
+              <a:rPr lang="en-US" smtClean="0">
+                <a:solidFill>
+                  <a:prstClr val="black"/>
+                </a:solidFill>
+              </a:rPr>
+              <a:pPr/>
+              <a:t>8/7/2017</a:t>
+            </a:fld>
+            <a:endParaRPr lang="en-US" dirty="0">
+              <a:solidFill>
+                <a:prstClr val="black"/>
+              </a:solidFill>
+            </a:endParaRPr>
+          </a:p>
+        </p:txBody>
+      </p:sp>
+      <p:sp>
+        <p:nvSpPr>
+          <p:cNvPr id="7" name="Slide Number Placeholder 6"/>
+          <p:cNvSpPr>
+            <a:spLocks noGrp="1"/>
+          </p:cNvSpPr>
+          <p:nvPr>
+            <p:ph type="sldNum" sz="quarter" idx="13"/>
+          </p:nvPr>
+        </p:nvSpPr>
+        <p:spPr/>
+        <p:txBody>
+          <a:bodyPr/>
+          <a:lstStyle/>
+          <a:p>
+            <a:fld id="{B4008EB6-D09E-4580-8CD6-DDB14511944F}" type="slidenum">
+              <a:rPr lang="en-US" smtClean="0">
+                <a:solidFill>
+                  <a:prstClr val="black"/>
+                </a:solidFill>
+              </a:rPr>
+              <a:pPr/>
+              <a:t>13</a:t>
+            </a:fld>
+            <a:endParaRPr lang="en-US" dirty="0">
+              <a:solidFill>
+                <a:prstClr val="black"/>
+              </a:solidFill>
+            </a:endParaRPr>
+          </a:p>
+        </p:txBody>
+      </p:sp>
+    </p:spTree>
+    <p:extLst>
+      <p:ext uri="{BB962C8B-B14F-4D97-AF65-F5344CB8AC3E}">
+        <p14:creationId xmlns:p14="http://schemas.microsoft.com/office/powerpoint/2010/main" val="3633352235"/>
+      </p:ext>
+    </p:extLst>
+  </p:cSld>
+  <p:clrMapOvr>
+    <a:masterClrMapping/>
+  </p:clrMapOvr>
+</p:notes>
+</file>
+
+<file path=ppt/notesSlides/notesSlide13.xml><?xml version="1.0" encoding="utf-8"?>
 <p:notes xmlns:a="http://schemas.openxmlformats.org/drawingml/2006/main" xmlns:r="http://schemas.openxmlformats.org/officeDocument/2006/relationships" xmlns:p="http://schemas.openxmlformats.org/presentationml/2006/main">
   <p:cSld>
     <p:spTree>
@@ -1739,7 +1955,7 @@
                 <a:tabLst/>
                 <a:defRPr/>
               </a:pPr>
-              <a:t>3/3/2017</a:t>
+              <a:t>8/7/2017</a:t>
             </a:fld>
             <a:endParaRPr kumimoji="0" lang="en-US" sz="1800" b="0" i="0" u="none" strike="noStrike" kern="0" cap="none" spc="0" normalizeH="0" baseline="0" noProof="0" dirty="0">
               <a:ln>
@@ -1816,7 +2032,7 @@
                 <a:tabLst/>
                 <a:defRPr/>
               </a:pPr>
-              <a:t>13</a:t>
+              <a:t>14</a:t>
             </a:fld>
             <a:endParaRPr kumimoji="0" lang="en-US" sz="1800" b="0" i="0" u="none" strike="noStrike" kern="0" cap="none" spc="0" normalizeH="0" baseline="0" noProof="0" dirty="0">
               <a:ln>
@@ -1836,216 +2052,6 @@
     <p:extLst>
       <p:ext uri="{BB962C8B-B14F-4D97-AF65-F5344CB8AC3E}">
         <p14:creationId xmlns:p14="http://schemas.microsoft.com/office/powerpoint/2010/main" val="2094861003"/>
-      </p:ext>
-    </p:extLst>
-  </p:cSld>
-  <p:clrMapOvr>
-    <a:masterClrMapping/>
-  </p:clrMapOvr>
-</p:notes>
-</file>
-
-<file path=ppt/notesSlides/notesSlide13.xml><?xml version="1.0" encoding="utf-8"?>
-<p:notes xmlns:a="http://schemas.openxmlformats.org/drawingml/2006/main" xmlns:r="http://schemas.openxmlformats.org/officeDocument/2006/relationships" xmlns:p="http://schemas.openxmlformats.org/presentationml/2006/main">
-  <p:cSld>
-    <p:spTree>
-      <p:nvGrpSpPr>
-        <p:cNvPr id="1" name=""/>
-        <p:cNvGrpSpPr/>
-        <p:nvPr/>
-      </p:nvGrpSpPr>
-      <p:grpSpPr>
-        <a:xfrm>
-          <a:off x="0" y="0"/>
-          <a:ext cx="0" cy="0"/>
-          <a:chOff x="0" y="0"/>
-          <a:chExt cx="0" cy="0"/>
-        </a:xfrm>
-      </p:grpSpPr>
-      <p:sp>
-        <p:nvSpPr>
-          <p:cNvPr id="2" name="Slide Image Placeholder 1"/>
-          <p:cNvSpPr>
-            <a:spLocks noGrp="1" noRot="1" noChangeAspect="1"/>
-          </p:cNvSpPr>
-          <p:nvPr>
-            <p:ph type="sldImg"/>
-          </p:nvPr>
-        </p:nvSpPr>
-        <p:spPr/>
-      </p:sp>
-      <p:sp>
-        <p:nvSpPr>
-          <p:cNvPr id="3" name="Notes Placeholder 2"/>
-          <p:cNvSpPr>
-            <a:spLocks noGrp="1"/>
-          </p:cNvSpPr>
-          <p:nvPr>
-            <p:ph type="body" idx="1"/>
-          </p:nvPr>
-        </p:nvSpPr>
-        <p:spPr/>
-        <p:txBody>
-          <a:bodyPr/>
-          <a:lstStyle/>
-          <a:p>
-            <a:endParaRPr lang="en-US"/>
-          </a:p>
-        </p:txBody>
-      </p:sp>
-      <p:sp>
-        <p:nvSpPr>
-          <p:cNvPr id="4" name="Footer Placeholder 3"/>
-          <p:cNvSpPr>
-            <a:spLocks noGrp="1"/>
-          </p:cNvSpPr>
-          <p:nvPr>
-            <p:ph type="ftr" sz="quarter" idx="10"/>
-          </p:nvPr>
-        </p:nvSpPr>
-        <p:spPr/>
-        <p:txBody>
-          <a:bodyPr/>
-          <a:lstStyle/>
-          <a:p>
-            <a:pPr defTabSz="914099" eaLnBrk="0" hangingPunct="0"/>
-            <a:r>
-              <a:rPr lang="en-US" sz="400">
-                <a:gradFill>
-                  <a:gsLst>
-                    <a:gs pos="0">
-                      <a:prstClr val="black"/>
-                    </a:gs>
-                    <a:gs pos="100000">
-                      <a:prstClr val="black"/>
-                    </a:gs>
-                  </a:gsLst>
-                  <a:lin ang="5400000" scaled="0"/>
-                </a:gradFill>
-                <a:latin typeface="Segoe UI" pitchFamily="34" charset="0"/>
-                <a:ea typeface="Segoe UI" pitchFamily="34" charset="0"/>
-                <a:cs typeface="Segoe UI" pitchFamily="34" charset="0"/>
-              </a:rPr>
-              <a:t>© 2014 Microsoft Corporation. All rights reserved. Microsoft, Windows, and other product names are or may be registered trademarks and/or trademarks in the U.S. and/or other countries. The information herein is for informational purposes only and represents the current view of Microsoft Corporation as of the date of this presentation.  Because Microsoft must respond to changing market conditions, it should not be interpreted to be a commitment on the part of Microsoft, and Microsoft cannot guarantee the accuracy of any information provided after the date of this presentation.  MICROSOFT MAKES NO WARRANTIES, EXPRESS, IMPLIED OR STATUTORY, AS TO THE INFORMATION IN THIS PRESENTATION.</a:t>
-            </a:r>
-            <a:endParaRPr lang="en-US" sz="400" dirty="0">
-              <a:gradFill>
-                <a:gsLst>
-                  <a:gs pos="0">
-                    <a:prstClr val="black"/>
-                  </a:gs>
-                  <a:gs pos="100000">
-                    <a:prstClr val="black"/>
-                  </a:gs>
-                </a:gsLst>
-                <a:lin ang="5400000" scaled="0"/>
-              </a:gradFill>
-              <a:latin typeface="Segoe UI" pitchFamily="34" charset="0"/>
-              <a:ea typeface="Segoe UI" pitchFamily="34" charset="0"/>
-              <a:cs typeface="Segoe UI" pitchFamily="34" charset="0"/>
-            </a:endParaRPr>
-          </a:p>
-        </p:txBody>
-      </p:sp>
-      <p:sp>
-        <p:nvSpPr>
-          <p:cNvPr id="5" name="Date Placeholder 4"/>
-          <p:cNvSpPr>
-            <a:spLocks noGrp="1"/>
-          </p:cNvSpPr>
-          <p:nvPr>
-            <p:ph type="dt" idx="11"/>
-          </p:nvPr>
-        </p:nvSpPr>
-        <p:spPr/>
-        <p:txBody>
-          <a:bodyPr/>
-          <a:lstStyle/>
-          <a:p>
-            <a:fld id="{FCF63DAE-D37E-4C44-BD81-0E251F1BE300}" type="datetime1">
-              <a:rPr lang="en-US" smtClean="0">
-                <a:solidFill>
-                  <a:prstClr val="black"/>
-                </a:solidFill>
-              </a:rPr>
-              <a:pPr/>
-              <a:t>3/3/2017</a:t>
-            </a:fld>
-            <a:endParaRPr lang="en-US" dirty="0">
-              <a:solidFill>
-                <a:prstClr val="black"/>
-              </a:solidFill>
-            </a:endParaRPr>
-          </a:p>
-        </p:txBody>
-      </p:sp>
-      <p:sp>
-        <p:nvSpPr>
-          <p:cNvPr id="6" name="Slide Number Placeholder 5"/>
-          <p:cNvSpPr>
-            <a:spLocks noGrp="1"/>
-          </p:cNvSpPr>
-          <p:nvPr>
-            <p:ph type="sldNum" sz="quarter" idx="12"/>
-          </p:nvPr>
-        </p:nvSpPr>
-        <p:spPr/>
-        <p:txBody>
-          <a:bodyPr/>
-          <a:lstStyle/>
-          <a:p>
-            <a:fld id="{B4008EB6-D09E-4580-8CD6-DDB14511944F}" type="slidenum">
-              <a:rPr lang="en-US" smtClean="0">
-                <a:solidFill>
-                  <a:prstClr val="black"/>
-                </a:solidFill>
-              </a:rPr>
-              <a:pPr/>
-              <a:t>14</a:t>
-            </a:fld>
-            <a:endParaRPr lang="en-US" dirty="0">
-              <a:solidFill>
-                <a:prstClr val="black"/>
-              </a:solidFill>
-            </a:endParaRPr>
-          </a:p>
-        </p:txBody>
-      </p:sp>
-      <p:sp>
-        <p:nvSpPr>
-          <p:cNvPr id="7" name="Header Placeholder 6"/>
-          <p:cNvSpPr>
-            <a:spLocks noGrp="1"/>
-          </p:cNvSpPr>
-          <p:nvPr>
-            <p:ph type="hdr" sz="quarter" idx="13"/>
-          </p:nvPr>
-        </p:nvSpPr>
-        <p:spPr/>
-        <p:txBody>
-          <a:bodyPr/>
-          <a:lstStyle/>
-          <a:p>
-            <a:r>
-              <a:rPr lang="en-US">
-                <a:solidFill>
-                  <a:prstClr val="black"/>
-                </a:solidFill>
-              </a:rPr>
-              <a:t>Build 2014</a:t>
-            </a:r>
-            <a:endParaRPr lang="en-US" dirty="0">
-              <a:solidFill>
-                <a:prstClr val="black"/>
-              </a:solidFill>
-            </a:endParaRPr>
-          </a:p>
-        </p:txBody>
-      </p:sp>
-    </p:spTree>
-    <p:extLst>
-      <p:ext uri="{BB962C8B-B14F-4D97-AF65-F5344CB8AC3E}">
-        <p14:creationId xmlns:p14="http://schemas.microsoft.com/office/powerpoint/2010/main" val="1796512126"/>
       </p:ext>
     </p:extLst>
   </p:cSld>
@@ -2105,43 +2111,12 @@
       </p:sp>
       <p:sp>
         <p:nvSpPr>
-          <p:cNvPr id="4" name="Header Placeholder 3"/>
-          <p:cNvSpPr>
-            <a:spLocks noGrp="1"/>
-          </p:cNvSpPr>
-          <p:nvPr>
-            <p:ph type="hdr" sz="quarter" idx="10"/>
-          </p:nvPr>
-        </p:nvSpPr>
-        <p:spPr/>
-        <p:txBody>
-          <a:bodyPr/>
-          <a:lstStyle/>
-          <a:p>
-            <a:r>
-              <a:rPr lang="en-US">
-                <a:solidFill>
-                  <a:prstClr val="black"/>
-                </a:solidFill>
-              </a:rPr>
-              <a:t>Build 2014</a:t>
-            </a:r>
-            <a:endParaRPr lang="en-US" dirty="0">
-              <a:solidFill>
-                <a:prstClr val="black"/>
-              </a:solidFill>
-            </a:endParaRPr>
-          </a:p>
-        </p:txBody>
-      </p:sp>
-      <p:sp>
-        <p:nvSpPr>
-          <p:cNvPr id="5" name="Footer Placeholder 4"/>
-          <p:cNvSpPr>
-            <a:spLocks noGrp="1"/>
-          </p:cNvSpPr>
-          <p:nvPr>
-            <p:ph type="ftr" sz="quarter" idx="11"/>
+          <p:cNvPr id="4" name="Footer Placeholder 3"/>
+          <p:cNvSpPr>
+            <a:spLocks noGrp="1"/>
+          </p:cNvSpPr>
+          <p:nvPr>
+            <p:ph type="ftr" sz="quarter" idx="10"/>
           </p:nvPr>
         </p:nvSpPr>
         <p:spPr/>
@@ -2190,12 +2165,12 @@
       </p:sp>
       <p:sp>
         <p:nvSpPr>
-          <p:cNvPr id="6" name="Date Placeholder 5"/>
-          <p:cNvSpPr>
-            <a:spLocks noGrp="1"/>
-          </p:cNvSpPr>
-          <p:nvPr>
-            <p:ph type="dt" idx="12"/>
+          <p:cNvPr id="5" name="Date Placeholder 4"/>
+          <p:cNvSpPr>
+            <a:spLocks noGrp="1"/>
+          </p:cNvSpPr>
+          <p:nvPr>
+            <p:ph type="dt" idx="11"/>
           </p:nvPr>
         </p:nvSpPr>
         <p:spPr/>
@@ -2203,14 +2178,14 @@
           <a:bodyPr/>
           <a:lstStyle/>
           <a:p>
-            <a:fld id="{9F00D60D-1703-4D24-8308-FEE06A50A69C}" type="datetime1">
+            <a:fld id="{FCF63DAE-D37E-4C44-BD81-0E251F1BE300}" type="datetime1">
               <a:rPr lang="en-US" smtClean="0">
                 <a:solidFill>
                   <a:prstClr val="black"/>
                 </a:solidFill>
               </a:rPr>
               <a:pPr/>
-              <a:t>3/3/2017</a:t>
+              <a:t>8/7/2017</a:t>
             </a:fld>
             <a:endParaRPr lang="en-US" dirty="0">
               <a:solidFill>
@@ -2222,12 +2197,12 @@
       </p:sp>
       <p:sp>
         <p:nvSpPr>
-          <p:cNvPr id="7" name="Slide Number Placeholder 6"/>
-          <p:cNvSpPr>
-            <a:spLocks noGrp="1"/>
-          </p:cNvSpPr>
-          <p:nvPr>
-            <p:ph type="sldNum" sz="quarter" idx="13"/>
+          <p:cNvPr id="6" name="Slide Number Placeholder 5"/>
+          <p:cNvSpPr>
+            <a:spLocks noGrp="1"/>
+          </p:cNvSpPr>
+          <p:nvPr>
+            <p:ph type="sldNum" sz="quarter" idx="12"/>
           </p:nvPr>
         </p:nvSpPr>
         <p:spPr/>
@@ -2242,7 +2217,7 @@
                 </a:solidFill>
               </a:rPr>
               <a:pPr/>
-              <a:t>16</a:t>
+              <a:t>15</a:t>
             </a:fld>
             <a:endParaRPr lang="en-US" dirty="0">
               <a:solidFill>
@@ -2252,10 +2227,41 @@
           </a:p>
         </p:txBody>
       </p:sp>
+      <p:sp>
+        <p:nvSpPr>
+          <p:cNvPr id="7" name="Header Placeholder 6"/>
+          <p:cNvSpPr>
+            <a:spLocks noGrp="1"/>
+          </p:cNvSpPr>
+          <p:nvPr>
+            <p:ph type="hdr" sz="quarter" idx="13"/>
+          </p:nvPr>
+        </p:nvSpPr>
+        <p:spPr/>
+        <p:txBody>
+          <a:bodyPr/>
+          <a:lstStyle/>
+          <a:p>
+            <a:r>
+              <a:rPr lang="en-US">
+                <a:solidFill>
+                  <a:prstClr val="black"/>
+                </a:solidFill>
+              </a:rPr>
+              <a:t>Build 2014</a:t>
+            </a:r>
+            <a:endParaRPr lang="en-US" dirty="0">
+              <a:solidFill>
+                <a:prstClr val="black"/>
+              </a:solidFill>
+            </a:endParaRPr>
+          </a:p>
+        </p:txBody>
+      </p:sp>
     </p:spTree>
     <p:extLst>
       <p:ext uri="{BB962C8B-B14F-4D97-AF65-F5344CB8AC3E}">
-        <p14:creationId xmlns:p14="http://schemas.microsoft.com/office/powerpoint/2010/main" val="1767268135"/>
+        <p14:creationId xmlns:p14="http://schemas.microsoft.com/office/powerpoint/2010/main" val="1796512126"/>
       </p:ext>
     </p:extLst>
   </p:cSld>
@@ -2420,7 +2426,7 @@
                 </a:solidFill>
               </a:rPr>
               <a:pPr/>
-              <a:t>3/3/2017</a:t>
+              <a:t>8/7/2017</a:t>
             </a:fld>
             <a:endParaRPr lang="en-US" dirty="0">
               <a:solidFill>
@@ -2465,7 +2471,7 @@
     </p:spTree>
     <p:extLst>
       <p:ext uri="{BB962C8B-B14F-4D97-AF65-F5344CB8AC3E}">
-        <p14:creationId xmlns:p14="http://schemas.microsoft.com/office/powerpoint/2010/main" val="2079953536"/>
+        <p14:creationId xmlns:p14="http://schemas.microsoft.com/office/powerpoint/2010/main" val="1767268135"/>
       </p:ext>
     </p:extLst>
   </p:cSld>
@@ -2630,7 +2636,7 @@
                 </a:solidFill>
               </a:rPr>
               <a:pPr/>
-              <a:t>3/3/2017</a:t>
+              <a:t>8/7/2017</a:t>
             </a:fld>
             <a:endParaRPr lang="en-US" dirty="0">
               <a:solidFill>
@@ -2675,7 +2681,7 @@
     </p:spTree>
     <p:extLst>
       <p:ext uri="{BB962C8B-B14F-4D97-AF65-F5344CB8AC3E}">
-        <p14:creationId xmlns:p14="http://schemas.microsoft.com/office/powerpoint/2010/main" val="2160785054"/>
+        <p14:creationId xmlns:p14="http://schemas.microsoft.com/office/powerpoint/2010/main" val="2079953536"/>
       </p:ext>
     </p:extLst>
   </p:cSld>
@@ -2840,7 +2846,7 @@
                 </a:solidFill>
               </a:rPr>
               <a:pPr/>
-              <a:t>3/3/2017</a:t>
+              <a:t>8/7/2017</a:t>
             </a:fld>
             <a:endParaRPr lang="en-US" dirty="0">
               <a:solidFill>
@@ -2885,7 +2891,7 @@
     </p:spTree>
     <p:extLst>
       <p:ext uri="{BB962C8B-B14F-4D97-AF65-F5344CB8AC3E}">
-        <p14:creationId xmlns:p14="http://schemas.microsoft.com/office/powerpoint/2010/main" val="2499110562"/>
+        <p14:creationId xmlns:p14="http://schemas.microsoft.com/office/powerpoint/2010/main" val="2160785054"/>
       </p:ext>
     </p:extLst>
   </p:cSld>
@@ -3050,7 +3056,7 @@
                 </a:solidFill>
               </a:rPr>
               <a:pPr/>
-              <a:t>3/3/2017</a:t>
+              <a:t>8/7/2017</a:t>
             </a:fld>
             <a:endParaRPr lang="en-US" dirty="0">
               <a:solidFill>
@@ -3095,7 +3101,7 @@
     </p:spTree>
     <p:extLst>
       <p:ext uri="{BB962C8B-B14F-4D97-AF65-F5344CB8AC3E}">
-        <p14:creationId xmlns:p14="http://schemas.microsoft.com/office/powerpoint/2010/main" val="3533442395"/>
+        <p14:creationId xmlns:p14="http://schemas.microsoft.com/office/powerpoint/2010/main" val="2499110562"/>
       </p:ext>
     </p:extLst>
   </p:cSld>
@@ -3260,7 +3266,7 @@
                 </a:solidFill>
               </a:rPr>
               <a:pPr/>
-              <a:t>3/3/2017</a:t>
+              <a:t>8/7/2017</a:t>
             </a:fld>
             <a:endParaRPr lang="en-US" dirty="0">
               <a:solidFill>
@@ -3305,7 +3311,7 @@
     </p:spTree>
     <p:extLst>
       <p:ext uri="{BB962C8B-B14F-4D97-AF65-F5344CB8AC3E}">
-        <p14:creationId xmlns:p14="http://schemas.microsoft.com/office/powerpoint/2010/main" val="1459406460"/>
+        <p14:creationId xmlns:p14="http://schemas.microsoft.com/office/powerpoint/2010/main" val="3533442395"/>
       </p:ext>
     </p:extLst>
   </p:cSld>
@@ -3434,7 +3440,7 @@
           <a:p>
             <a:fld id="{B079C3B8-7366-4A44-A34B-3977080C19E7}" type="datetime1">
               <a:rPr lang="en-US" smtClean="0"/>
-              <a:t>3/3/2017</a:t>
+              <a:t>8/7/2017</a:t>
             </a:fld>
             <a:endParaRPr lang="en-US" dirty="0"/>
           </a:p>
@@ -3501,6 +3507,216 @@
 </file>
 
 <file path=ppt/notesSlides/notesSlide20.xml><?xml version="1.0" encoding="utf-8"?>
+<p:notes xmlns:a="http://schemas.openxmlformats.org/drawingml/2006/main" xmlns:r="http://schemas.openxmlformats.org/officeDocument/2006/relationships" xmlns:p="http://schemas.openxmlformats.org/presentationml/2006/main">
+  <p:cSld>
+    <p:spTree>
+      <p:nvGrpSpPr>
+        <p:cNvPr id="1" name=""/>
+        <p:cNvGrpSpPr/>
+        <p:nvPr/>
+      </p:nvGrpSpPr>
+      <p:grpSpPr>
+        <a:xfrm>
+          <a:off x="0" y="0"/>
+          <a:ext cx="0" cy="0"/>
+          <a:chOff x="0" y="0"/>
+          <a:chExt cx="0" cy="0"/>
+        </a:xfrm>
+      </p:grpSpPr>
+      <p:sp>
+        <p:nvSpPr>
+          <p:cNvPr id="2" name="Slide Image Placeholder 1"/>
+          <p:cNvSpPr>
+            <a:spLocks noGrp="1" noRot="1" noChangeAspect="1"/>
+          </p:cNvSpPr>
+          <p:nvPr>
+            <p:ph type="sldImg"/>
+          </p:nvPr>
+        </p:nvSpPr>
+        <p:spPr/>
+      </p:sp>
+      <p:sp>
+        <p:nvSpPr>
+          <p:cNvPr id="3" name="Notes Placeholder 2"/>
+          <p:cNvSpPr>
+            <a:spLocks noGrp="1"/>
+          </p:cNvSpPr>
+          <p:nvPr>
+            <p:ph type="body" idx="1"/>
+          </p:nvPr>
+        </p:nvSpPr>
+        <p:spPr/>
+        <p:txBody>
+          <a:bodyPr/>
+          <a:lstStyle/>
+          <a:p>
+            <a:endParaRPr lang="en-US"/>
+          </a:p>
+        </p:txBody>
+      </p:sp>
+      <p:sp>
+        <p:nvSpPr>
+          <p:cNvPr id="4" name="Header Placeholder 3"/>
+          <p:cNvSpPr>
+            <a:spLocks noGrp="1"/>
+          </p:cNvSpPr>
+          <p:nvPr>
+            <p:ph type="hdr" sz="quarter" idx="10"/>
+          </p:nvPr>
+        </p:nvSpPr>
+        <p:spPr/>
+        <p:txBody>
+          <a:bodyPr/>
+          <a:lstStyle/>
+          <a:p>
+            <a:r>
+              <a:rPr lang="en-US">
+                <a:solidFill>
+                  <a:prstClr val="black"/>
+                </a:solidFill>
+              </a:rPr>
+              <a:t>Build 2014</a:t>
+            </a:r>
+            <a:endParaRPr lang="en-US" dirty="0">
+              <a:solidFill>
+                <a:prstClr val="black"/>
+              </a:solidFill>
+            </a:endParaRPr>
+          </a:p>
+        </p:txBody>
+      </p:sp>
+      <p:sp>
+        <p:nvSpPr>
+          <p:cNvPr id="5" name="Footer Placeholder 4"/>
+          <p:cNvSpPr>
+            <a:spLocks noGrp="1"/>
+          </p:cNvSpPr>
+          <p:nvPr>
+            <p:ph type="ftr" sz="quarter" idx="11"/>
+          </p:nvPr>
+        </p:nvSpPr>
+        <p:spPr/>
+        <p:txBody>
+          <a:bodyPr/>
+          <a:lstStyle/>
+          <a:p>
+            <a:pPr defTabSz="914099" eaLnBrk="0" hangingPunct="0"/>
+            <a:r>
+              <a:rPr lang="en-US" sz="400">
+                <a:gradFill>
+                  <a:gsLst>
+                    <a:gs pos="0">
+                      <a:prstClr val="black"/>
+                    </a:gs>
+                    <a:gs pos="100000">
+                      <a:prstClr val="black"/>
+                    </a:gs>
+                  </a:gsLst>
+                  <a:lin ang="5400000" scaled="0"/>
+                </a:gradFill>
+                <a:latin typeface="Segoe UI" pitchFamily="34" charset="0"/>
+                <a:ea typeface="Segoe UI" pitchFamily="34" charset="0"/>
+                <a:cs typeface="Segoe UI" pitchFamily="34" charset="0"/>
+              </a:rPr>
+              <a:t>© 2014 Microsoft Corporation. All rights reserved. Microsoft, Windows, and other product names are or may be registered trademarks and/or trademarks in the U.S. and/or other countries. The information herein is for informational purposes only and represents the current view of Microsoft Corporation as of the date of this presentation.  Because Microsoft must respond to changing market conditions, it should not be interpreted to be a commitment on the part of Microsoft, and Microsoft cannot guarantee the accuracy of any information provided after the date of this presentation.  MICROSOFT MAKES NO WARRANTIES, EXPRESS, IMPLIED OR STATUTORY, AS TO THE INFORMATION IN THIS PRESENTATION.</a:t>
+            </a:r>
+            <a:endParaRPr lang="en-US" sz="400" dirty="0">
+              <a:gradFill>
+                <a:gsLst>
+                  <a:gs pos="0">
+                    <a:prstClr val="black"/>
+                  </a:gs>
+                  <a:gs pos="100000">
+                    <a:prstClr val="black"/>
+                  </a:gs>
+                </a:gsLst>
+                <a:lin ang="5400000" scaled="0"/>
+              </a:gradFill>
+              <a:latin typeface="Segoe UI" pitchFamily="34" charset="0"/>
+              <a:ea typeface="Segoe UI" pitchFamily="34" charset="0"/>
+              <a:cs typeface="Segoe UI" pitchFamily="34" charset="0"/>
+            </a:endParaRPr>
+          </a:p>
+        </p:txBody>
+      </p:sp>
+      <p:sp>
+        <p:nvSpPr>
+          <p:cNvPr id="6" name="Date Placeholder 5"/>
+          <p:cNvSpPr>
+            <a:spLocks noGrp="1"/>
+          </p:cNvSpPr>
+          <p:nvPr>
+            <p:ph type="dt" idx="12"/>
+          </p:nvPr>
+        </p:nvSpPr>
+        <p:spPr/>
+        <p:txBody>
+          <a:bodyPr/>
+          <a:lstStyle/>
+          <a:p>
+            <a:fld id="{9F00D60D-1703-4D24-8308-FEE06A50A69C}" type="datetime1">
+              <a:rPr lang="en-US" smtClean="0">
+                <a:solidFill>
+                  <a:prstClr val="black"/>
+                </a:solidFill>
+              </a:rPr>
+              <a:pPr/>
+              <a:t>8/7/2017</a:t>
+            </a:fld>
+            <a:endParaRPr lang="en-US" dirty="0">
+              <a:solidFill>
+                <a:prstClr val="black"/>
+              </a:solidFill>
+            </a:endParaRPr>
+          </a:p>
+        </p:txBody>
+      </p:sp>
+      <p:sp>
+        <p:nvSpPr>
+          <p:cNvPr id="7" name="Slide Number Placeholder 6"/>
+          <p:cNvSpPr>
+            <a:spLocks noGrp="1"/>
+          </p:cNvSpPr>
+          <p:nvPr>
+            <p:ph type="sldNum" sz="quarter" idx="13"/>
+          </p:nvPr>
+        </p:nvSpPr>
+        <p:spPr/>
+        <p:txBody>
+          <a:bodyPr/>
+          <a:lstStyle/>
+          <a:p>
+            <a:fld id="{B4008EB6-D09E-4580-8CD6-DDB14511944F}" type="slidenum">
+              <a:rPr lang="en-US" smtClean="0">
+                <a:solidFill>
+                  <a:prstClr val="black"/>
+                </a:solidFill>
+              </a:rPr>
+              <a:pPr/>
+              <a:t>22</a:t>
+            </a:fld>
+            <a:endParaRPr lang="en-US" dirty="0">
+              <a:solidFill>
+                <a:prstClr val="black"/>
+              </a:solidFill>
+            </a:endParaRPr>
+          </a:p>
+        </p:txBody>
+      </p:sp>
+    </p:spTree>
+    <p:extLst>
+      <p:ext uri="{BB962C8B-B14F-4D97-AF65-F5344CB8AC3E}">
+        <p14:creationId xmlns:p14="http://schemas.microsoft.com/office/powerpoint/2010/main" val="1459406460"/>
+      </p:ext>
+    </p:extLst>
+  </p:cSld>
+  <p:clrMapOvr>
+    <a:masterClrMapping/>
+  </p:clrMapOvr>
+</p:notes>
+</file>
+
+<file path=ppt/notesSlides/notesSlide21.xml><?xml version="1.0" encoding="utf-8"?>
 <p:notes xmlns:a="http://schemas.openxmlformats.org/drawingml/2006/main" xmlns:r="http://schemas.openxmlformats.org/officeDocument/2006/relationships" xmlns:p="http://schemas.openxmlformats.org/presentationml/2006/main">
   <p:cSld>
     <p:spTree>
@@ -3751,7 +3967,7 @@
                 <a:tabLst/>
                 <a:defRPr/>
               </a:pPr>
-              <a:t>3/3/2017</a:t>
+              <a:t>8/7/2017</a:t>
             </a:fld>
             <a:endParaRPr kumimoji="0" lang="en-US" sz="1800" b="0" i="0" u="none" strike="noStrike" kern="0" cap="none" spc="0" normalizeH="0" baseline="0" noProof="0" dirty="0">
               <a:ln>
@@ -3828,7 +4044,7 @@
                 <a:tabLst/>
                 <a:defRPr/>
               </a:pPr>
-              <a:t>22</a:t>
+              <a:t>23</a:t>
             </a:fld>
             <a:endParaRPr kumimoji="0" lang="en-US" sz="1800" b="0" i="0" u="none" strike="noStrike" kern="0" cap="none" spc="0" normalizeH="0" baseline="0" noProof="0" dirty="0">
               <a:ln>
@@ -3848,216 +4064,6 @@
     <p:extLst>
       <p:ext uri="{BB962C8B-B14F-4D97-AF65-F5344CB8AC3E}">
         <p14:creationId xmlns:p14="http://schemas.microsoft.com/office/powerpoint/2010/main" val="476893638"/>
-      </p:ext>
-    </p:extLst>
-  </p:cSld>
-  <p:clrMapOvr>
-    <a:masterClrMapping/>
-  </p:clrMapOvr>
-</p:notes>
-</file>
-
-<file path=ppt/notesSlides/notesSlide21.xml><?xml version="1.0" encoding="utf-8"?>
-<p:notes xmlns:a="http://schemas.openxmlformats.org/drawingml/2006/main" xmlns:r="http://schemas.openxmlformats.org/officeDocument/2006/relationships" xmlns:p="http://schemas.openxmlformats.org/presentationml/2006/main">
-  <p:cSld>
-    <p:spTree>
-      <p:nvGrpSpPr>
-        <p:cNvPr id="1" name=""/>
-        <p:cNvGrpSpPr/>
-        <p:nvPr/>
-      </p:nvGrpSpPr>
-      <p:grpSpPr>
-        <a:xfrm>
-          <a:off x="0" y="0"/>
-          <a:ext cx="0" cy="0"/>
-          <a:chOff x="0" y="0"/>
-          <a:chExt cx="0" cy="0"/>
-        </a:xfrm>
-      </p:grpSpPr>
-      <p:sp>
-        <p:nvSpPr>
-          <p:cNvPr id="2" name="Slide Image Placeholder 1"/>
-          <p:cNvSpPr>
-            <a:spLocks noGrp="1" noRot="1" noChangeAspect="1"/>
-          </p:cNvSpPr>
-          <p:nvPr>
-            <p:ph type="sldImg"/>
-          </p:nvPr>
-        </p:nvSpPr>
-        <p:spPr/>
-      </p:sp>
-      <p:sp>
-        <p:nvSpPr>
-          <p:cNvPr id="3" name="Notes Placeholder 2"/>
-          <p:cNvSpPr>
-            <a:spLocks noGrp="1"/>
-          </p:cNvSpPr>
-          <p:nvPr>
-            <p:ph type="body" idx="1"/>
-          </p:nvPr>
-        </p:nvSpPr>
-        <p:spPr/>
-        <p:txBody>
-          <a:bodyPr/>
-          <a:lstStyle/>
-          <a:p>
-            <a:endParaRPr lang="en-US"/>
-          </a:p>
-        </p:txBody>
-      </p:sp>
-      <p:sp>
-        <p:nvSpPr>
-          <p:cNvPr id="4" name="Footer Placeholder 3"/>
-          <p:cNvSpPr>
-            <a:spLocks noGrp="1"/>
-          </p:cNvSpPr>
-          <p:nvPr>
-            <p:ph type="ftr" sz="quarter" idx="10"/>
-          </p:nvPr>
-        </p:nvSpPr>
-        <p:spPr/>
-        <p:txBody>
-          <a:bodyPr/>
-          <a:lstStyle/>
-          <a:p>
-            <a:pPr defTabSz="914099" eaLnBrk="0" hangingPunct="0"/>
-            <a:r>
-              <a:rPr lang="en-US" sz="400">
-                <a:gradFill>
-                  <a:gsLst>
-                    <a:gs pos="0">
-                      <a:prstClr val="black"/>
-                    </a:gs>
-                    <a:gs pos="100000">
-                      <a:prstClr val="black"/>
-                    </a:gs>
-                  </a:gsLst>
-                  <a:lin ang="5400000" scaled="0"/>
-                </a:gradFill>
-                <a:latin typeface="Segoe UI" pitchFamily="34" charset="0"/>
-                <a:ea typeface="Segoe UI" pitchFamily="34" charset="0"/>
-                <a:cs typeface="Segoe UI" pitchFamily="34" charset="0"/>
-              </a:rPr>
-              <a:t>© 2014 Microsoft Corporation. All rights reserved. Microsoft, Windows, and other product names are or may be registered trademarks and/or trademarks in the U.S. and/or other countries. The information herein is for informational purposes only and represents the current view of Microsoft Corporation as of the date of this presentation.  Because Microsoft must respond to changing market conditions, it should not be interpreted to be a commitment on the part of Microsoft, and Microsoft cannot guarantee the accuracy of any information provided after the date of this presentation.  MICROSOFT MAKES NO WARRANTIES, EXPRESS, IMPLIED OR STATUTORY, AS TO THE INFORMATION IN THIS PRESENTATION.</a:t>
-            </a:r>
-            <a:endParaRPr lang="en-US" sz="400" dirty="0">
-              <a:gradFill>
-                <a:gsLst>
-                  <a:gs pos="0">
-                    <a:prstClr val="black"/>
-                  </a:gs>
-                  <a:gs pos="100000">
-                    <a:prstClr val="black"/>
-                  </a:gs>
-                </a:gsLst>
-                <a:lin ang="5400000" scaled="0"/>
-              </a:gradFill>
-              <a:latin typeface="Segoe UI" pitchFamily="34" charset="0"/>
-              <a:ea typeface="Segoe UI" pitchFamily="34" charset="0"/>
-              <a:cs typeface="Segoe UI" pitchFamily="34" charset="0"/>
-            </a:endParaRPr>
-          </a:p>
-        </p:txBody>
-      </p:sp>
-      <p:sp>
-        <p:nvSpPr>
-          <p:cNvPr id="5" name="Date Placeholder 4"/>
-          <p:cNvSpPr>
-            <a:spLocks noGrp="1"/>
-          </p:cNvSpPr>
-          <p:nvPr>
-            <p:ph type="dt" idx="11"/>
-          </p:nvPr>
-        </p:nvSpPr>
-        <p:spPr/>
-        <p:txBody>
-          <a:bodyPr/>
-          <a:lstStyle/>
-          <a:p>
-            <a:fld id="{FCF63DAE-D37E-4C44-BD81-0E251F1BE300}" type="datetime1">
-              <a:rPr lang="en-US" smtClean="0">
-                <a:solidFill>
-                  <a:prstClr val="black"/>
-                </a:solidFill>
-              </a:rPr>
-              <a:pPr/>
-              <a:t>3/3/2017</a:t>
-            </a:fld>
-            <a:endParaRPr lang="en-US" dirty="0">
-              <a:solidFill>
-                <a:prstClr val="black"/>
-              </a:solidFill>
-            </a:endParaRPr>
-          </a:p>
-        </p:txBody>
-      </p:sp>
-      <p:sp>
-        <p:nvSpPr>
-          <p:cNvPr id="6" name="Slide Number Placeholder 5"/>
-          <p:cNvSpPr>
-            <a:spLocks noGrp="1"/>
-          </p:cNvSpPr>
-          <p:nvPr>
-            <p:ph type="sldNum" sz="quarter" idx="12"/>
-          </p:nvPr>
-        </p:nvSpPr>
-        <p:spPr/>
-        <p:txBody>
-          <a:bodyPr/>
-          <a:lstStyle/>
-          <a:p>
-            <a:fld id="{B4008EB6-D09E-4580-8CD6-DDB14511944F}" type="slidenum">
-              <a:rPr lang="en-US" smtClean="0">
-                <a:solidFill>
-                  <a:prstClr val="black"/>
-                </a:solidFill>
-              </a:rPr>
-              <a:pPr/>
-              <a:t>23</a:t>
-            </a:fld>
-            <a:endParaRPr lang="en-US" dirty="0">
-              <a:solidFill>
-                <a:prstClr val="black"/>
-              </a:solidFill>
-            </a:endParaRPr>
-          </a:p>
-        </p:txBody>
-      </p:sp>
-      <p:sp>
-        <p:nvSpPr>
-          <p:cNvPr id="7" name="Header Placeholder 6"/>
-          <p:cNvSpPr>
-            <a:spLocks noGrp="1"/>
-          </p:cNvSpPr>
-          <p:nvPr>
-            <p:ph type="hdr" sz="quarter" idx="13"/>
-          </p:nvPr>
-        </p:nvSpPr>
-        <p:spPr/>
-        <p:txBody>
-          <a:bodyPr/>
-          <a:lstStyle/>
-          <a:p>
-            <a:r>
-              <a:rPr lang="en-US">
-                <a:solidFill>
-                  <a:prstClr val="black"/>
-                </a:solidFill>
-              </a:rPr>
-              <a:t>Build 2014</a:t>
-            </a:r>
-            <a:endParaRPr lang="en-US" dirty="0">
-              <a:solidFill>
-                <a:prstClr val="black"/>
-              </a:solidFill>
-            </a:endParaRPr>
-          </a:p>
-        </p:txBody>
-      </p:sp>
-    </p:spTree>
-    <p:extLst>
-      <p:ext uri="{BB962C8B-B14F-4D97-AF65-F5344CB8AC3E}">
-        <p14:creationId xmlns:p14="http://schemas.microsoft.com/office/powerpoint/2010/main" val="2327117907"/>
       </p:ext>
     </p:extLst>
   </p:cSld>
@@ -4117,43 +4123,12 @@
       </p:sp>
       <p:sp>
         <p:nvSpPr>
-          <p:cNvPr id="4" name="Header Placeholder 3"/>
-          <p:cNvSpPr>
-            <a:spLocks noGrp="1"/>
-          </p:cNvSpPr>
-          <p:nvPr>
-            <p:ph type="hdr" sz="quarter" idx="10"/>
-          </p:nvPr>
-        </p:nvSpPr>
-        <p:spPr/>
-        <p:txBody>
-          <a:bodyPr/>
-          <a:lstStyle/>
-          <a:p>
-            <a:r>
-              <a:rPr lang="en-US">
-                <a:solidFill>
-                  <a:prstClr val="black"/>
-                </a:solidFill>
-              </a:rPr>
-              <a:t>Build 2014</a:t>
-            </a:r>
-            <a:endParaRPr lang="en-US" dirty="0">
-              <a:solidFill>
-                <a:prstClr val="black"/>
-              </a:solidFill>
-            </a:endParaRPr>
-          </a:p>
-        </p:txBody>
-      </p:sp>
-      <p:sp>
-        <p:nvSpPr>
-          <p:cNvPr id="5" name="Footer Placeholder 4"/>
-          <p:cNvSpPr>
-            <a:spLocks noGrp="1"/>
-          </p:cNvSpPr>
-          <p:nvPr>
-            <p:ph type="ftr" sz="quarter" idx="11"/>
+          <p:cNvPr id="4" name="Footer Placeholder 3"/>
+          <p:cNvSpPr>
+            <a:spLocks noGrp="1"/>
+          </p:cNvSpPr>
+          <p:nvPr>
+            <p:ph type="ftr" sz="quarter" idx="10"/>
           </p:nvPr>
         </p:nvSpPr>
         <p:spPr/>
@@ -4202,12 +4177,12 @@
       </p:sp>
       <p:sp>
         <p:nvSpPr>
-          <p:cNvPr id="6" name="Date Placeholder 5"/>
-          <p:cNvSpPr>
-            <a:spLocks noGrp="1"/>
-          </p:cNvSpPr>
-          <p:nvPr>
-            <p:ph type="dt" idx="12"/>
+          <p:cNvPr id="5" name="Date Placeholder 4"/>
+          <p:cNvSpPr>
+            <a:spLocks noGrp="1"/>
+          </p:cNvSpPr>
+          <p:nvPr>
+            <p:ph type="dt" idx="11"/>
           </p:nvPr>
         </p:nvSpPr>
         <p:spPr/>
@@ -4215,14 +4190,14 @@
           <a:bodyPr/>
           <a:lstStyle/>
           <a:p>
-            <a:fld id="{9F00D60D-1703-4D24-8308-FEE06A50A69C}" type="datetime1">
+            <a:fld id="{FCF63DAE-D37E-4C44-BD81-0E251F1BE300}" type="datetime1">
               <a:rPr lang="en-US" smtClean="0">
                 <a:solidFill>
                   <a:prstClr val="black"/>
                 </a:solidFill>
               </a:rPr>
               <a:pPr/>
-              <a:t>3/3/2017</a:t>
+              <a:t>8/7/2017</a:t>
             </a:fld>
             <a:endParaRPr lang="en-US" dirty="0">
               <a:solidFill>
@@ -4234,12 +4209,12 @@
       </p:sp>
       <p:sp>
         <p:nvSpPr>
-          <p:cNvPr id="7" name="Slide Number Placeholder 6"/>
-          <p:cNvSpPr>
-            <a:spLocks noGrp="1"/>
-          </p:cNvSpPr>
-          <p:nvPr>
-            <p:ph type="sldNum" sz="quarter" idx="13"/>
+          <p:cNvPr id="6" name="Slide Number Placeholder 5"/>
+          <p:cNvSpPr>
+            <a:spLocks noGrp="1"/>
+          </p:cNvSpPr>
+          <p:nvPr>
+            <p:ph type="sldNum" sz="quarter" idx="12"/>
           </p:nvPr>
         </p:nvSpPr>
         <p:spPr/>
@@ -4254,7 +4229,7 @@
                 </a:solidFill>
               </a:rPr>
               <a:pPr/>
-              <a:t>25</a:t>
+              <a:t>24</a:t>
             </a:fld>
             <a:endParaRPr lang="en-US" dirty="0">
               <a:solidFill>
@@ -4264,10 +4239,41 @@
           </a:p>
         </p:txBody>
       </p:sp>
+      <p:sp>
+        <p:nvSpPr>
+          <p:cNvPr id="7" name="Header Placeholder 6"/>
+          <p:cNvSpPr>
+            <a:spLocks noGrp="1"/>
+          </p:cNvSpPr>
+          <p:nvPr>
+            <p:ph type="hdr" sz="quarter" idx="13"/>
+          </p:nvPr>
+        </p:nvSpPr>
+        <p:spPr/>
+        <p:txBody>
+          <a:bodyPr/>
+          <a:lstStyle/>
+          <a:p>
+            <a:r>
+              <a:rPr lang="en-US">
+                <a:solidFill>
+                  <a:prstClr val="black"/>
+                </a:solidFill>
+              </a:rPr>
+              <a:t>Build 2014</a:t>
+            </a:r>
+            <a:endParaRPr lang="en-US" dirty="0">
+              <a:solidFill>
+                <a:prstClr val="black"/>
+              </a:solidFill>
+            </a:endParaRPr>
+          </a:p>
+        </p:txBody>
+      </p:sp>
     </p:spTree>
     <p:extLst>
       <p:ext uri="{BB962C8B-B14F-4D97-AF65-F5344CB8AC3E}">
-        <p14:creationId xmlns:p14="http://schemas.microsoft.com/office/powerpoint/2010/main" val="2934531598"/>
+        <p14:creationId xmlns:p14="http://schemas.microsoft.com/office/powerpoint/2010/main" val="2327117907"/>
       </p:ext>
     </p:extLst>
   </p:cSld>
@@ -4432,7 +4438,7 @@
                 </a:solidFill>
               </a:rPr>
               <a:pPr/>
-              <a:t>3/3/2017</a:t>
+              <a:t>8/7/2017</a:t>
             </a:fld>
             <a:endParaRPr lang="en-US" dirty="0">
               <a:solidFill>
@@ -4477,7 +4483,7 @@
     </p:spTree>
     <p:extLst>
       <p:ext uri="{BB962C8B-B14F-4D97-AF65-F5344CB8AC3E}">
-        <p14:creationId xmlns:p14="http://schemas.microsoft.com/office/powerpoint/2010/main" val="3906853571"/>
+        <p14:creationId xmlns:p14="http://schemas.microsoft.com/office/powerpoint/2010/main" val="2934531598"/>
       </p:ext>
     </p:extLst>
   </p:cSld>
@@ -4642,7 +4648,7 @@
                 </a:solidFill>
               </a:rPr>
               <a:pPr/>
-              <a:t>3/3/2017</a:t>
+              <a:t>8/7/2017</a:t>
             </a:fld>
             <a:endParaRPr lang="en-US" dirty="0">
               <a:solidFill>
@@ -4687,7 +4693,7 @@
     </p:spTree>
     <p:extLst>
       <p:ext uri="{BB962C8B-B14F-4D97-AF65-F5344CB8AC3E}">
-        <p14:creationId xmlns:p14="http://schemas.microsoft.com/office/powerpoint/2010/main" val="528904937"/>
+        <p14:creationId xmlns:p14="http://schemas.microsoft.com/office/powerpoint/2010/main" val="3906853571"/>
       </p:ext>
     </p:extLst>
   </p:cSld>
@@ -4852,7 +4858,7 @@
                 </a:solidFill>
               </a:rPr>
               <a:pPr/>
-              <a:t>3/3/2017</a:t>
+              <a:t>8/7/2017</a:t>
             </a:fld>
             <a:endParaRPr lang="en-US" dirty="0">
               <a:solidFill>
@@ -4897,7 +4903,7 @@
     </p:spTree>
     <p:extLst>
       <p:ext uri="{BB962C8B-B14F-4D97-AF65-F5344CB8AC3E}">
-        <p14:creationId xmlns:p14="http://schemas.microsoft.com/office/powerpoint/2010/main" val="1370500354"/>
+        <p14:creationId xmlns:p14="http://schemas.microsoft.com/office/powerpoint/2010/main" val="528904937"/>
       </p:ext>
     </p:extLst>
   </p:cSld>
@@ -5062,7 +5068,7 @@
                 </a:solidFill>
               </a:rPr>
               <a:pPr/>
-              <a:t>3/3/2017</a:t>
+              <a:t>8/7/2017</a:t>
             </a:fld>
             <a:endParaRPr lang="en-US" dirty="0">
               <a:solidFill>
@@ -5107,7 +5113,7 @@
     </p:spTree>
     <p:extLst>
       <p:ext uri="{BB962C8B-B14F-4D97-AF65-F5344CB8AC3E}">
-        <p14:creationId xmlns:p14="http://schemas.microsoft.com/office/powerpoint/2010/main" val="3470729680"/>
+        <p14:creationId xmlns:p14="http://schemas.microsoft.com/office/powerpoint/2010/main" val="1370500354"/>
       </p:ext>
     </p:extLst>
   </p:cSld>
@@ -5272,7 +5278,7 @@
                 </a:solidFill>
               </a:rPr>
               <a:pPr/>
-              <a:t>3/3/2017</a:t>
+              <a:t>8/7/2017</a:t>
             </a:fld>
             <a:endParaRPr lang="en-US" dirty="0">
               <a:solidFill>
@@ -5317,6 +5323,216 @@
     </p:spTree>
     <p:extLst>
       <p:ext uri="{BB962C8B-B14F-4D97-AF65-F5344CB8AC3E}">
+        <p14:creationId xmlns:p14="http://schemas.microsoft.com/office/powerpoint/2010/main" val="3470729680"/>
+      </p:ext>
+    </p:extLst>
+  </p:cSld>
+  <p:clrMapOvr>
+    <a:masterClrMapping/>
+  </p:clrMapOvr>
+</p:notes>
+</file>
+
+<file path=ppt/notesSlides/notesSlide28.xml><?xml version="1.0" encoding="utf-8"?>
+<p:notes xmlns:a="http://schemas.openxmlformats.org/drawingml/2006/main" xmlns:r="http://schemas.openxmlformats.org/officeDocument/2006/relationships" xmlns:p="http://schemas.openxmlformats.org/presentationml/2006/main">
+  <p:cSld>
+    <p:spTree>
+      <p:nvGrpSpPr>
+        <p:cNvPr id="1" name=""/>
+        <p:cNvGrpSpPr/>
+        <p:nvPr/>
+      </p:nvGrpSpPr>
+      <p:grpSpPr>
+        <a:xfrm>
+          <a:off x="0" y="0"/>
+          <a:ext cx="0" cy="0"/>
+          <a:chOff x="0" y="0"/>
+          <a:chExt cx="0" cy="0"/>
+        </a:xfrm>
+      </p:grpSpPr>
+      <p:sp>
+        <p:nvSpPr>
+          <p:cNvPr id="2" name="Slide Image Placeholder 1"/>
+          <p:cNvSpPr>
+            <a:spLocks noGrp="1" noRot="1" noChangeAspect="1"/>
+          </p:cNvSpPr>
+          <p:nvPr>
+            <p:ph type="sldImg"/>
+          </p:nvPr>
+        </p:nvSpPr>
+        <p:spPr/>
+      </p:sp>
+      <p:sp>
+        <p:nvSpPr>
+          <p:cNvPr id="3" name="Notes Placeholder 2"/>
+          <p:cNvSpPr>
+            <a:spLocks noGrp="1"/>
+          </p:cNvSpPr>
+          <p:nvPr>
+            <p:ph type="body" idx="1"/>
+          </p:nvPr>
+        </p:nvSpPr>
+        <p:spPr/>
+        <p:txBody>
+          <a:bodyPr/>
+          <a:lstStyle/>
+          <a:p>
+            <a:endParaRPr lang="en-US"/>
+          </a:p>
+        </p:txBody>
+      </p:sp>
+      <p:sp>
+        <p:nvSpPr>
+          <p:cNvPr id="4" name="Header Placeholder 3"/>
+          <p:cNvSpPr>
+            <a:spLocks noGrp="1"/>
+          </p:cNvSpPr>
+          <p:nvPr>
+            <p:ph type="hdr" sz="quarter" idx="10"/>
+          </p:nvPr>
+        </p:nvSpPr>
+        <p:spPr/>
+        <p:txBody>
+          <a:bodyPr/>
+          <a:lstStyle/>
+          <a:p>
+            <a:r>
+              <a:rPr lang="en-US">
+                <a:solidFill>
+                  <a:prstClr val="black"/>
+                </a:solidFill>
+              </a:rPr>
+              <a:t>Build 2014</a:t>
+            </a:r>
+            <a:endParaRPr lang="en-US" dirty="0">
+              <a:solidFill>
+                <a:prstClr val="black"/>
+              </a:solidFill>
+            </a:endParaRPr>
+          </a:p>
+        </p:txBody>
+      </p:sp>
+      <p:sp>
+        <p:nvSpPr>
+          <p:cNvPr id="5" name="Footer Placeholder 4"/>
+          <p:cNvSpPr>
+            <a:spLocks noGrp="1"/>
+          </p:cNvSpPr>
+          <p:nvPr>
+            <p:ph type="ftr" sz="quarter" idx="11"/>
+          </p:nvPr>
+        </p:nvSpPr>
+        <p:spPr/>
+        <p:txBody>
+          <a:bodyPr/>
+          <a:lstStyle/>
+          <a:p>
+            <a:pPr defTabSz="914099" eaLnBrk="0" hangingPunct="0"/>
+            <a:r>
+              <a:rPr lang="en-US" sz="400">
+                <a:gradFill>
+                  <a:gsLst>
+                    <a:gs pos="0">
+                      <a:prstClr val="black"/>
+                    </a:gs>
+                    <a:gs pos="100000">
+                      <a:prstClr val="black"/>
+                    </a:gs>
+                  </a:gsLst>
+                  <a:lin ang="5400000" scaled="0"/>
+                </a:gradFill>
+                <a:latin typeface="Segoe UI" pitchFamily="34" charset="0"/>
+                <a:ea typeface="Segoe UI" pitchFamily="34" charset="0"/>
+                <a:cs typeface="Segoe UI" pitchFamily="34" charset="0"/>
+              </a:rPr>
+              <a:t>© 2014 Microsoft Corporation. All rights reserved. Microsoft, Windows, and other product names are or may be registered trademarks and/or trademarks in the U.S. and/or other countries. The information herein is for informational purposes only and represents the current view of Microsoft Corporation as of the date of this presentation.  Because Microsoft must respond to changing market conditions, it should not be interpreted to be a commitment on the part of Microsoft, and Microsoft cannot guarantee the accuracy of any information provided after the date of this presentation.  MICROSOFT MAKES NO WARRANTIES, EXPRESS, IMPLIED OR STATUTORY, AS TO THE INFORMATION IN THIS PRESENTATION.</a:t>
+            </a:r>
+            <a:endParaRPr lang="en-US" sz="400" dirty="0">
+              <a:gradFill>
+                <a:gsLst>
+                  <a:gs pos="0">
+                    <a:prstClr val="black"/>
+                  </a:gs>
+                  <a:gs pos="100000">
+                    <a:prstClr val="black"/>
+                  </a:gs>
+                </a:gsLst>
+                <a:lin ang="5400000" scaled="0"/>
+              </a:gradFill>
+              <a:latin typeface="Segoe UI" pitchFamily="34" charset="0"/>
+              <a:ea typeface="Segoe UI" pitchFamily="34" charset="0"/>
+              <a:cs typeface="Segoe UI" pitchFamily="34" charset="0"/>
+            </a:endParaRPr>
+          </a:p>
+        </p:txBody>
+      </p:sp>
+      <p:sp>
+        <p:nvSpPr>
+          <p:cNvPr id="6" name="Date Placeholder 5"/>
+          <p:cNvSpPr>
+            <a:spLocks noGrp="1"/>
+          </p:cNvSpPr>
+          <p:nvPr>
+            <p:ph type="dt" idx="12"/>
+          </p:nvPr>
+        </p:nvSpPr>
+        <p:spPr/>
+        <p:txBody>
+          <a:bodyPr/>
+          <a:lstStyle/>
+          <a:p>
+            <a:fld id="{9F00D60D-1703-4D24-8308-FEE06A50A69C}" type="datetime1">
+              <a:rPr lang="en-US" smtClean="0">
+                <a:solidFill>
+                  <a:prstClr val="black"/>
+                </a:solidFill>
+              </a:rPr>
+              <a:pPr/>
+              <a:t>8/7/2017</a:t>
+            </a:fld>
+            <a:endParaRPr lang="en-US" dirty="0">
+              <a:solidFill>
+                <a:prstClr val="black"/>
+              </a:solidFill>
+            </a:endParaRPr>
+          </a:p>
+        </p:txBody>
+      </p:sp>
+      <p:sp>
+        <p:nvSpPr>
+          <p:cNvPr id="7" name="Slide Number Placeholder 6"/>
+          <p:cNvSpPr>
+            <a:spLocks noGrp="1"/>
+          </p:cNvSpPr>
+          <p:nvPr>
+            <p:ph type="sldNum" sz="quarter" idx="13"/>
+          </p:nvPr>
+        </p:nvSpPr>
+        <p:spPr/>
+        <p:txBody>
+          <a:bodyPr/>
+          <a:lstStyle/>
+          <a:p>
+            <a:fld id="{B4008EB6-D09E-4580-8CD6-DDB14511944F}" type="slidenum">
+              <a:rPr lang="en-US" smtClean="0">
+                <a:solidFill>
+                  <a:prstClr val="black"/>
+                </a:solidFill>
+              </a:rPr>
+              <a:pPr/>
+              <a:t>31</a:t>
+            </a:fld>
+            <a:endParaRPr lang="en-US" dirty="0">
+              <a:solidFill>
+                <a:prstClr val="black"/>
+              </a:solidFill>
+            </a:endParaRPr>
+          </a:p>
+        </p:txBody>
+      </p:sp>
+    </p:spTree>
+    <p:extLst>
+      <p:ext uri="{BB962C8B-B14F-4D97-AF65-F5344CB8AC3E}">
         <p14:creationId xmlns:p14="http://schemas.microsoft.com/office/powerpoint/2010/main" val="1796095888"/>
       </p:ext>
     </p:extLst>
@@ -5327,7 +5543,7 @@
 </p:notes>
 </file>
 
-<file path=ppt/notesSlides/notesSlide28.xml><?xml version="1.0" encoding="utf-8"?>
+<file path=ppt/notesSlides/notesSlide29.xml><?xml version="1.0" encoding="utf-8"?>
 <p:notes xmlns:a="http://schemas.openxmlformats.org/drawingml/2006/main" xmlns:r="http://schemas.openxmlformats.org/officeDocument/2006/relationships" xmlns:p="http://schemas.openxmlformats.org/presentationml/2006/main">
   <p:cSld>
     <p:spTree>
@@ -5578,7 +5794,7 @@
                 <a:tabLst/>
                 <a:defRPr/>
               </a:pPr>
-              <a:t>3/3/2017</a:t>
+              <a:t>8/7/2017</a:t>
             </a:fld>
             <a:endParaRPr kumimoji="0" lang="en-US" sz="1800" b="0" i="0" u="none" strike="noStrike" kern="0" cap="none" spc="0" normalizeH="0" baseline="0" noProof="0" dirty="0">
               <a:ln>
@@ -5655,7 +5871,7 @@
                 <a:tabLst/>
                 <a:defRPr/>
               </a:pPr>
-              <a:t>31</a:t>
+              <a:t>32</a:t>
             </a:fld>
             <a:endParaRPr kumimoji="0" lang="en-US" sz="1800" b="0" i="0" u="none" strike="noStrike" kern="0" cap="none" spc="0" normalizeH="0" baseline="0" noProof="0" dirty="0">
               <a:ln>
@@ -5675,216 +5891,6 @@
     <p:extLst>
       <p:ext uri="{BB962C8B-B14F-4D97-AF65-F5344CB8AC3E}">
         <p14:creationId xmlns:p14="http://schemas.microsoft.com/office/powerpoint/2010/main" val="1968014362"/>
-      </p:ext>
-    </p:extLst>
-  </p:cSld>
-  <p:clrMapOvr>
-    <a:masterClrMapping/>
-  </p:clrMapOvr>
-</p:notes>
-</file>
-
-<file path=ppt/notesSlides/notesSlide29.xml><?xml version="1.0" encoding="utf-8"?>
-<p:notes xmlns:a="http://schemas.openxmlformats.org/drawingml/2006/main" xmlns:r="http://schemas.openxmlformats.org/officeDocument/2006/relationships" xmlns:p="http://schemas.openxmlformats.org/presentationml/2006/main">
-  <p:cSld>
-    <p:spTree>
-      <p:nvGrpSpPr>
-        <p:cNvPr id="1" name=""/>
-        <p:cNvGrpSpPr/>
-        <p:nvPr/>
-      </p:nvGrpSpPr>
-      <p:grpSpPr>
-        <a:xfrm>
-          <a:off x="0" y="0"/>
-          <a:ext cx="0" cy="0"/>
-          <a:chOff x="0" y="0"/>
-          <a:chExt cx="0" cy="0"/>
-        </a:xfrm>
-      </p:grpSpPr>
-      <p:sp>
-        <p:nvSpPr>
-          <p:cNvPr id="2" name="Slide Image Placeholder 1"/>
-          <p:cNvSpPr>
-            <a:spLocks noGrp="1" noRot="1" noChangeAspect="1"/>
-          </p:cNvSpPr>
-          <p:nvPr>
-            <p:ph type="sldImg"/>
-          </p:nvPr>
-        </p:nvSpPr>
-        <p:spPr/>
-      </p:sp>
-      <p:sp>
-        <p:nvSpPr>
-          <p:cNvPr id="3" name="Notes Placeholder 2"/>
-          <p:cNvSpPr>
-            <a:spLocks noGrp="1"/>
-          </p:cNvSpPr>
-          <p:nvPr>
-            <p:ph type="body" idx="1"/>
-          </p:nvPr>
-        </p:nvSpPr>
-        <p:spPr/>
-        <p:txBody>
-          <a:bodyPr/>
-          <a:lstStyle/>
-          <a:p>
-            <a:endParaRPr lang="en-US"/>
-          </a:p>
-        </p:txBody>
-      </p:sp>
-      <p:sp>
-        <p:nvSpPr>
-          <p:cNvPr id="4" name="Footer Placeholder 3"/>
-          <p:cNvSpPr>
-            <a:spLocks noGrp="1"/>
-          </p:cNvSpPr>
-          <p:nvPr>
-            <p:ph type="ftr" sz="quarter" idx="10"/>
-          </p:nvPr>
-        </p:nvSpPr>
-        <p:spPr/>
-        <p:txBody>
-          <a:bodyPr/>
-          <a:lstStyle/>
-          <a:p>
-            <a:pPr defTabSz="914099" eaLnBrk="0" hangingPunct="0"/>
-            <a:r>
-              <a:rPr lang="en-US" sz="400">
-                <a:gradFill>
-                  <a:gsLst>
-                    <a:gs pos="0">
-                      <a:prstClr val="black"/>
-                    </a:gs>
-                    <a:gs pos="100000">
-                      <a:prstClr val="black"/>
-                    </a:gs>
-                  </a:gsLst>
-                  <a:lin ang="5400000" scaled="0"/>
-                </a:gradFill>
-                <a:latin typeface="Segoe UI" pitchFamily="34" charset="0"/>
-                <a:ea typeface="Segoe UI" pitchFamily="34" charset="0"/>
-                <a:cs typeface="Segoe UI" pitchFamily="34" charset="0"/>
-              </a:rPr>
-              <a:t>© 2014 Microsoft Corporation. All rights reserved. Microsoft, Windows, and other product names are or may be registered trademarks and/or trademarks in the U.S. and/or other countries. The information herein is for informational purposes only and represents the current view of Microsoft Corporation as of the date of this presentation.  Because Microsoft must respond to changing market conditions, it should not be interpreted to be a commitment on the part of Microsoft, and Microsoft cannot guarantee the accuracy of any information provided after the date of this presentation.  MICROSOFT MAKES NO WARRANTIES, EXPRESS, IMPLIED OR STATUTORY, AS TO THE INFORMATION IN THIS PRESENTATION.</a:t>
-            </a:r>
-            <a:endParaRPr lang="en-US" sz="400" dirty="0">
-              <a:gradFill>
-                <a:gsLst>
-                  <a:gs pos="0">
-                    <a:prstClr val="black"/>
-                  </a:gs>
-                  <a:gs pos="100000">
-                    <a:prstClr val="black"/>
-                  </a:gs>
-                </a:gsLst>
-                <a:lin ang="5400000" scaled="0"/>
-              </a:gradFill>
-              <a:latin typeface="Segoe UI" pitchFamily="34" charset="0"/>
-              <a:ea typeface="Segoe UI" pitchFamily="34" charset="0"/>
-              <a:cs typeface="Segoe UI" pitchFamily="34" charset="0"/>
-            </a:endParaRPr>
-          </a:p>
-        </p:txBody>
-      </p:sp>
-      <p:sp>
-        <p:nvSpPr>
-          <p:cNvPr id="5" name="Date Placeholder 4"/>
-          <p:cNvSpPr>
-            <a:spLocks noGrp="1"/>
-          </p:cNvSpPr>
-          <p:nvPr>
-            <p:ph type="dt" idx="11"/>
-          </p:nvPr>
-        </p:nvSpPr>
-        <p:spPr/>
-        <p:txBody>
-          <a:bodyPr/>
-          <a:lstStyle/>
-          <a:p>
-            <a:fld id="{FCF63DAE-D37E-4C44-BD81-0E251F1BE300}" type="datetime1">
-              <a:rPr lang="en-US" smtClean="0">
-                <a:solidFill>
-                  <a:prstClr val="black"/>
-                </a:solidFill>
-              </a:rPr>
-              <a:pPr/>
-              <a:t>3/3/2017</a:t>
-            </a:fld>
-            <a:endParaRPr lang="en-US" dirty="0">
-              <a:solidFill>
-                <a:prstClr val="black"/>
-              </a:solidFill>
-            </a:endParaRPr>
-          </a:p>
-        </p:txBody>
-      </p:sp>
-      <p:sp>
-        <p:nvSpPr>
-          <p:cNvPr id="6" name="Slide Number Placeholder 5"/>
-          <p:cNvSpPr>
-            <a:spLocks noGrp="1"/>
-          </p:cNvSpPr>
-          <p:nvPr>
-            <p:ph type="sldNum" sz="quarter" idx="12"/>
-          </p:nvPr>
-        </p:nvSpPr>
-        <p:spPr/>
-        <p:txBody>
-          <a:bodyPr/>
-          <a:lstStyle/>
-          <a:p>
-            <a:fld id="{B4008EB6-D09E-4580-8CD6-DDB14511944F}" type="slidenum">
-              <a:rPr lang="en-US" smtClean="0">
-                <a:solidFill>
-                  <a:prstClr val="black"/>
-                </a:solidFill>
-              </a:rPr>
-              <a:pPr/>
-              <a:t>32</a:t>
-            </a:fld>
-            <a:endParaRPr lang="en-US" dirty="0">
-              <a:solidFill>
-                <a:prstClr val="black"/>
-              </a:solidFill>
-            </a:endParaRPr>
-          </a:p>
-        </p:txBody>
-      </p:sp>
-      <p:sp>
-        <p:nvSpPr>
-          <p:cNvPr id="7" name="Header Placeholder 6"/>
-          <p:cNvSpPr>
-            <a:spLocks noGrp="1"/>
-          </p:cNvSpPr>
-          <p:nvPr>
-            <p:ph type="hdr" sz="quarter" idx="13"/>
-          </p:nvPr>
-        </p:nvSpPr>
-        <p:spPr/>
-        <p:txBody>
-          <a:bodyPr/>
-          <a:lstStyle/>
-          <a:p>
-            <a:r>
-              <a:rPr lang="en-US">
-                <a:solidFill>
-                  <a:prstClr val="black"/>
-                </a:solidFill>
-              </a:rPr>
-              <a:t>Build 2014</a:t>
-            </a:r>
-            <a:endParaRPr lang="en-US" dirty="0">
-              <a:solidFill>
-                <a:prstClr val="black"/>
-              </a:solidFill>
-            </a:endParaRPr>
-          </a:p>
-        </p:txBody>
-      </p:sp>
-    </p:spTree>
-    <p:extLst>
-      <p:ext uri="{BB962C8B-B14F-4D97-AF65-F5344CB8AC3E}">
-        <p14:creationId xmlns:p14="http://schemas.microsoft.com/office/powerpoint/2010/main" val="777518763"/>
       </p:ext>
     </p:extLst>
   </p:cSld>
@@ -6018,7 +6024,7 @@
                 </a:solidFill>
               </a:rPr>
               <a:pPr/>
-              <a:t>3/3/2017</a:t>
+              <a:t>8/7/2017</a:t>
             </a:fld>
             <a:endParaRPr lang="en-US" dirty="0">
               <a:solidFill>
@@ -6154,43 +6160,12 @@
       </p:sp>
       <p:sp>
         <p:nvSpPr>
-          <p:cNvPr id="4" name="Header Placeholder 3"/>
-          <p:cNvSpPr>
-            <a:spLocks noGrp="1"/>
-          </p:cNvSpPr>
-          <p:nvPr>
-            <p:ph type="hdr" sz="quarter" idx="10"/>
-          </p:nvPr>
-        </p:nvSpPr>
-        <p:spPr/>
-        <p:txBody>
-          <a:bodyPr/>
-          <a:lstStyle/>
-          <a:p>
-            <a:r>
-              <a:rPr lang="en-US">
-                <a:solidFill>
-                  <a:prstClr val="black"/>
-                </a:solidFill>
-              </a:rPr>
-              <a:t>Build 2014</a:t>
-            </a:r>
-            <a:endParaRPr lang="en-US" dirty="0">
-              <a:solidFill>
-                <a:prstClr val="black"/>
-              </a:solidFill>
-            </a:endParaRPr>
-          </a:p>
-        </p:txBody>
-      </p:sp>
-      <p:sp>
-        <p:nvSpPr>
-          <p:cNvPr id="5" name="Footer Placeholder 4"/>
-          <p:cNvSpPr>
-            <a:spLocks noGrp="1"/>
-          </p:cNvSpPr>
-          <p:nvPr>
-            <p:ph type="ftr" sz="quarter" idx="11"/>
+          <p:cNvPr id="4" name="Footer Placeholder 3"/>
+          <p:cNvSpPr>
+            <a:spLocks noGrp="1"/>
+          </p:cNvSpPr>
+          <p:nvPr>
+            <p:ph type="ftr" sz="quarter" idx="10"/>
           </p:nvPr>
         </p:nvSpPr>
         <p:spPr/>
@@ -6239,12 +6214,12 @@
       </p:sp>
       <p:sp>
         <p:nvSpPr>
-          <p:cNvPr id="6" name="Date Placeholder 5"/>
-          <p:cNvSpPr>
-            <a:spLocks noGrp="1"/>
-          </p:cNvSpPr>
-          <p:nvPr>
-            <p:ph type="dt" idx="12"/>
+          <p:cNvPr id="5" name="Date Placeholder 4"/>
+          <p:cNvSpPr>
+            <a:spLocks noGrp="1"/>
+          </p:cNvSpPr>
+          <p:nvPr>
+            <p:ph type="dt" idx="11"/>
           </p:nvPr>
         </p:nvSpPr>
         <p:spPr/>
@@ -6252,14 +6227,14 @@
           <a:bodyPr/>
           <a:lstStyle/>
           <a:p>
-            <a:fld id="{9F00D60D-1703-4D24-8308-FEE06A50A69C}" type="datetime1">
+            <a:fld id="{FCF63DAE-D37E-4C44-BD81-0E251F1BE300}" type="datetime1">
               <a:rPr lang="en-US" smtClean="0">
                 <a:solidFill>
                   <a:prstClr val="black"/>
                 </a:solidFill>
               </a:rPr>
               <a:pPr/>
-              <a:t>3/3/2017</a:t>
+              <a:t>8/7/2017</a:t>
             </a:fld>
             <a:endParaRPr lang="en-US" dirty="0">
               <a:solidFill>
@@ -6271,12 +6246,12 @@
       </p:sp>
       <p:sp>
         <p:nvSpPr>
-          <p:cNvPr id="7" name="Slide Number Placeholder 6"/>
-          <p:cNvSpPr>
-            <a:spLocks noGrp="1"/>
-          </p:cNvSpPr>
-          <p:nvPr>
-            <p:ph type="sldNum" sz="quarter" idx="13"/>
+          <p:cNvPr id="6" name="Slide Number Placeholder 5"/>
+          <p:cNvSpPr>
+            <a:spLocks noGrp="1"/>
+          </p:cNvSpPr>
+          <p:nvPr>
+            <p:ph type="sldNum" sz="quarter" idx="12"/>
           </p:nvPr>
         </p:nvSpPr>
         <p:spPr/>
@@ -6301,10 +6276,41 @@
           </a:p>
         </p:txBody>
       </p:sp>
+      <p:sp>
+        <p:nvSpPr>
+          <p:cNvPr id="7" name="Header Placeholder 6"/>
+          <p:cNvSpPr>
+            <a:spLocks noGrp="1"/>
+          </p:cNvSpPr>
+          <p:nvPr>
+            <p:ph type="hdr" sz="quarter" idx="13"/>
+          </p:nvPr>
+        </p:nvSpPr>
+        <p:spPr/>
+        <p:txBody>
+          <a:bodyPr/>
+          <a:lstStyle/>
+          <a:p>
+            <a:r>
+              <a:rPr lang="en-US">
+                <a:solidFill>
+                  <a:prstClr val="black"/>
+                </a:solidFill>
+              </a:rPr>
+              <a:t>Build 2014</a:t>
+            </a:r>
+            <a:endParaRPr lang="en-US" dirty="0">
+              <a:solidFill>
+                <a:prstClr val="black"/>
+              </a:solidFill>
+            </a:endParaRPr>
+          </a:p>
+        </p:txBody>
+      </p:sp>
     </p:spTree>
     <p:extLst>
       <p:ext uri="{BB962C8B-B14F-4D97-AF65-F5344CB8AC3E}">
-        <p14:creationId xmlns:p14="http://schemas.microsoft.com/office/powerpoint/2010/main" val="2808479397"/>
+        <p14:creationId xmlns:p14="http://schemas.microsoft.com/office/powerpoint/2010/main" val="777518763"/>
       </p:ext>
     </p:extLst>
   </p:cSld>
@@ -6364,12 +6370,43 @@
       </p:sp>
       <p:sp>
         <p:nvSpPr>
-          <p:cNvPr id="4" name="Footer Placeholder 3"/>
-          <p:cNvSpPr>
-            <a:spLocks noGrp="1"/>
-          </p:cNvSpPr>
-          <p:nvPr>
-            <p:ph type="ftr" sz="quarter" idx="10"/>
+          <p:cNvPr id="4" name="Header Placeholder 3"/>
+          <p:cNvSpPr>
+            <a:spLocks noGrp="1"/>
+          </p:cNvSpPr>
+          <p:nvPr>
+            <p:ph type="hdr" sz="quarter" idx="10"/>
+          </p:nvPr>
+        </p:nvSpPr>
+        <p:spPr/>
+        <p:txBody>
+          <a:bodyPr/>
+          <a:lstStyle/>
+          <a:p>
+            <a:r>
+              <a:rPr lang="en-US">
+                <a:solidFill>
+                  <a:prstClr val="black"/>
+                </a:solidFill>
+              </a:rPr>
+              <a:t>Build 2014</a:t>
+            </a:r>
+            <a:endParaRPr lang="en-US" dirty="0">
+              <a:solidFill>
+                <a:prstClr val="black"/>
+              </a:solidFill>
+            </a:endParaRPr>
+          </a:p>
+        </p:txBody>
+      </p:sp>
+      <p:sp>
+        <p:nvSpPr>
+          <p:cNvPr id="5" name="Footer Placeholder 4"/>
+          <p:cNvSpPr>
+            <a:spLocks noGrp="1"/>
+          </p:cNvSpPr>
+          <p:nvPr>
+            <p:ph type="ftr" sz="quarter" idx="11"/>
           </p:nvPr>
         </p:nvSpPr>
         <p:spPr/>
@@ -6418,12 +6455,12 @@
       </p:sp>
       <p:sp>
         <p:nvSpPr>
-          <p:cNvPr id="5" name="Date Placeholder 4"/>
-          <p:cNvSpPr>
-            <a:spLocks noGrp="1"/>
-          </p:cNvSpPr>
-          <p:nvPr>
-            <p:ph type="dt" idx="11"/>
+          <p:cNvPr id="6" name="Date Placeholder 5"/>
+          <p:cNvSpPr>
+            <a:spLocks noGrp="1"/>
+          </p:cNvSpPr>
+          <p:nvPr>
+            <p:ph type="dt" idx="12"/>
           </p:nvPr>
         </p:nvSpPr>
         <p:spPr/>
@@ -6431,14 +6468,14 @@
           <a:bodyPr/>
           <a:lstStyle/>
           <a:p>
-            <a:fld id="{FCF63DAE-D37E-4C44-BD81-0E251F1BE300}" type="datetime1">
+            <a:fld id="{9F00D60D-1703-4D24-8308-FEE06A50A69C}" type="datetime1">
               <a:rPr lang="en-US" smtClean="0">
                 <a:solidFill>
                   <a:prstClr val="black"/>
                 </a:solidFill>
               </a:rPr>
               <a:pPr/>
-              <a:t>3/3/2017</a:t>
+              <a:t>8/7/2017</a:t>
             </a:fld>
             <a:endParaRPr lang="en-US" dirty="0">
               <a:solidFill>
@@ -6450,12 +6487,12 @@
       </p:sp>
       <p:sp>
         <p:nvSpPr>
-          <p:cNvPr id="6" name="Slide Number Placeholder 5"/>
-          <p:cNvSpPr>
-            <a:spLocks noGrp="1"/>
-          </p:cNvSpPr>
-          <p:nvPr>
-            <p:ph type="sldNum" sz="quarter" idx="12"/>
+          <p:cNvPr id="7" name="Slide Number Placeholder 6"/>
+          <p:cNvSpPr>
+            <a:spLocks noGrp="1"/>
+          </p:cNvSpPr>
+          <p:nvPr>
+            <p:ph type="sldNum" sz="quarter" idx="13"/>
           </p:nvPr>
         </p:nvSpPr>
         <p:spPr/>
@@ -6480,41 +6517,10 @@
           </a:p>
         </p:txBody>
       </p:sp>
-      <p:sp>
-        <p:nvSpPr>
-          <p:cNvPr id="7" name="Header Placeholder 6"/>
-          <p:cNvSpPr>
-            <a:spLocks noGrp="1"/>
-          </p:cNvSpPr>
-          <p:nvPr>
-            <p:ph type="hdr" sz="quarter" idx="13"/>
-          </p:nvPr>
-        </p:nvSpPr>
-        <p:spPr/>
-        <p:txBody>
-          <a:bodyPr/>
-          <a:lstStyle/>
-          <a:p>
-            <a:r>
-              <a:rPr lang="en-US">
-                <a:solidFill>
-                  <a:prstClr val="black"/>
-                </a:solidFill>
-              </a:rPr>
-              <a:t>Build 2014</a:t>
-            </a:r>
-            <a:endParaRPr lang="en-US" dirty="0">
-              <a:solidFill>
-                <a:prstClr val="black"/>
-              </a:solidFill>
-            </a:endParaRPr>
-          </a:p>
-        </p:txBody>
-      </p:sp>
     </p:spTree>
     <p:extLst>
       <p:ext uri="{BB962C8B-B14F-4D97-AF65-F5344CB8AC3E}">
-        <p14:creationId xmlns:p14="http://schemas.microsoft.com/office/powerpoint/2010/main" val="809730823"/>
+        <p14:creationId xmlns:p14="http://schemas.microsoft.com/office/powerpoint/2010/main" val="2808479397"/>
       </p:ext>
     </p:extLst>
   </p:cSld>
@@ -6574,43 +6580,12 @@
       </p:sp>
       <p:sp>
         <p:nvSpPr>
-          <p:cNvPr id="4" name="Header Placeholder 3"/>
-          <p:cNvSpPr>
-            <a:spLocks noGrp="1"/>
-          </p:cNvSpPr>
-          <p:nvPr>
-            <p:ph type="hdr" sz="quarter" idx="10"/>
-          </p:nvPr>
-        </p:nvSpPr>
-        <p:spPr/>
-        <p:txBody>
-          <a:bodyPr/>
-          <a:lstStyle/>
-          <a:p>
-            <a:r>
-              <a:rPr lang="en-US">
-                <a:solidFill>
-                  <a:prstClr val="black"/>
-                </a:solidFill>
-              </a:rPr>
-              <a:t>Build 2014</a:t>
-            </a:r>
-            <a:endParaRPr lang="en-US" dirty="0">
-              <a:solidFill>
-                <a:prstClr val="black"/>
-              </a:solidFill>
-            </a:endParaRPr>
-          </a:p>
-        </p:txBody>
-      </p:sp>
-      <p:sp>
-        <p:nvSpPr>
-          <p:cNvPr id="5" name="Footer Placeholder 4"/>
-          <p:cNvSpPr>
-            <a:spLocks noGrp="1"/>
-          </p:cNvSpPr>
-          <p:nvPr>
-            <p:ph type="ftr" sz="quarter" idx="11"/>
+          <p:cNvPr id="4" name="Footer Placeholder 3"/>
+          <p:cNvSpPr>
+            <a:spLocks noGrp="1"/>
+          </p:cNvSpPr>
+          <p:nvPr>
+            <p:ph type="ftr" sz="quarter" idx="10"/>
           </p:nvPr>
         </p:nvSpPr>
         <p:spPr/>
@@ -6659,12 +6634,12 @@
       </p:sp>
       <p:sp>
         <p:nvSpPr>
-          <p:cNvPr id="6" name="Date Placeholder 5"/>
-          <p:cNvSpPr>
-            <a:spLocks noGrp="1"/>
-          </p:cNvSpPr>
-          <p:nvPr>
-            <p:ph type="dt" idx="12"/>
+          <p:cNvPr id="5" name="Date Placeholder 4"/>
+          <p:cNvSpPr>
+            <a:spLocks noGrp="1"/>
+          </p:cNvSpPr>
+          <p:nvPr>
+            <p:ph type="dt" idx="11"/>
           </p:nvPr>
         </p:nvSpPr>
         <p:spPr/>
@@ -6672,14 +6647,14 @@
           <a:bodyPr/>
           <a:lstStyle/>
           <a:p>
-            <a:fld id="{9F00D60D-1703-4D24-8308-FEE06A50A69C}" type="datetime1">
+            <a:fld id="{FCF63DAE-D37E-4C44-BD81-0E251F1BE300}" type="datetime1">
               <a:rPr lang="en-US" smtClean="0">
                 <a:solidFill>
                   <a:prstClr val="black"/>
                 </a:solidFill>
               </a:rPr>
               <a:pPr/>
-              <a:t>3/3/2017</a:t>
+              <a:t>8/7/2017</a:t>
             </a:fld>
             <a:endParaRPr lang="en-US" dirty="0">
               <a:solidFill>
@@ -6691,12 +6666,12 @@
       </p:sp>
       <p:sp>
         <p:nvSpPr>
-          <p:cNvPr id="7" name="Slide Number Placeholder 6"/>
-          <p:cNvSpPr>
-            <a:spLocks noGrp="1"/>
-          </p:cNvSpPr>
-          <p:nvPr>
-            <p:ph type="sldNum" sz="quarter" idx="13"/>
+          <p:cNvPr id="6" name="Slide Number Placeholder 5"/>
+          <p:cNvSpPr>
+            <a:spLocks noGrp="1"/>
+          </p:cNvSpPr>
+          <p:nvPr>
+            <p:ph type="sldNum" sz="quarter" idx="12"/>
           </p:nvPr>
         </p:nvSpPr>
         <p:spPr/>
@@ -6721,10 +6696,41 @@
           </a:p>
         </p:txBody>
       </p:sp>
+      <p:sp>
+        <p:nvSpPr>
+          <p:cNvPr id="7" name="Header Placeholder 6"/>
+          <p:cNvSpPr>
+            <a:spLocks noGrp="1"/>
+          </p:cNvSpPr>
+          <p:nvPr>
+            <p:ph type="hdr" sz="quarter" idx="13"/>
+          </p:nvPr>
+        </p:nvSpPr>
+        <p:spPr/>
+        <p:txBody>
+          <a:bodyPr/>
+          <a:lstStyle/>
+          <a:p>
+            <a:r>
+              <a:rPr lang="en-US">
+                <a:solidFill>
+                  <a:prstClr val="black"/>
+                </a:solidFill>
+              </a:rPr>
+              <a:t>Build 2014</a:t>
+            </a:r>
+            <a:endParaRPr lang="en-US" dirty="0">
+              <a:solidFill>
+                <a:prstClr val="black"/>
+              </a:solidFill>
+            </a:endParaRPr>
+          </a:p>
+        </p:txBody>
+      </p:sp>
     </p:spTree>
     <p:extLst>
       <p:ext uri="{BB962C8B-B14F-4D97-AF65-F5344CB8AC3E}">
-        <p14:creationId xmlns:p14="http://schemas.microsoft.com/office/powerpoint/2010/main" val="3222582736"/>
+        <p14:creationId xmlns:p14="http://schemas.microsoft.com/office/powerpoint/2010/main" val="809730823"/>
       </p:ext>
     </p:extLst>
   </p:cSld>
@@ -6889,7 +6895,7 @@
                 </a:solidFill>
               </a:rPr>
               <a:pPr/>
-              <a:t>3/3/2017</a:t>
+              <a:t>8/7/2017</a:t>
             </a:fld>
             <a:endParaRPr lang="en-US" dirty="0">
               <a:solidFill>
@@ -6934,7 +6940,7 @@
     </p:spTree>
     <p:extLst>
       <p:ext uri="{BB962C8B-B14F-4D97-AF65-F5344CB8AC3E}">
-        <p14:creationId xmlns:p14="http://schemas.microsoft.com/office/powerpoint/2010/main" val="2882451625"/>
+        <p14:creationId xmlns:p14="http://schemas.microsoft.com/office/powerpoint/2010/main" val="3222582736"/>
       </p:ext>
     </p:extLst>
   </p:cSld>
@@ -6994,12 +7000,43 @@
       </p:sp>
       <p:sp>
         <p:nvSpPr>
-          <p:cNvPr id="4" name="Footer Placeholder 3"/>
-          <p:cNvSpPr>
-            <a:spLocks noGrp="1"/>
-          </p:cNvSpPr>
-          <p:nvPr>
-            <p:ph type="ftr" sz="quarter" idx="10"/>
+          <p:cNvPr id="4" name="Header Placeholder 3"/>
+          <p:cNvSpPr>
+            <a:spLocks noGrp="1"/>
+          </p:cNvSpPr>
+          <p:nvPr>
+            <p:ph type="hdr" sz="quarter" idx="10"/>
+          </p:nvPr>
+        </p:nvSpPr>
+        <p:spPr/>
+        <p:txBody>
+          <a:bodyPr/>
+          <a:lstStyle/>
+          <a:p>
+            <a:r>
+              <a:rPr lang="en-US">
+                <a:solidFill>
+                  <a:prstClr val="black"/>
+                </a:solidFill>
+              </a:rPr>
+              <a:t>Build 2014</a:t>
+            </a:r>
+            <a:endParaRPr lang="en-US" dirty="0">
+              <a:solidFill>
+                <a:prstClr val="black"/>
+              </a:solidFill>
+            </a:endParaRPr>
+          </a:p>
+        </p:txBody>
+      </p:sp>
+      <p:sp>
+        <p:nvSpPr>
+          <p:cNvPr id="5" name="Footer Placeholder 4"/>
+          <p:cNvSpPr>
+            <a:spLocks noGrp="1"/>
+          </p:cNvSpPr>
+          <p:nvPr>
+            <p:ph type="ftr" sz="quarter" idx="11"/>
           </p:nvPr>
         </p:nvSpPr>
         <p:spPr/>
@@ -7048,12 +7085,12 @@
       </p:sp>
       <p:sp>
         <p:nvSpPr>
-          <p:cNvPr id="5" name="Date Placeholder 4"/>
-          <p:cNvSpPr>
-            <a:spLocks noGrp="1"/>
-          </p:cNvSpPr>
-          <p:nvPr>
-            <p:ph type="dt" idx="11"/>
+          <p:cNvPr id="6" name="Date Placeholder 5"/>
+          <p:cNvSpPr>
+            <a:spLocks noGrp="1"/>
+          </p:cNvSpPr>
+          <p:nvPr>
+            <p:ph type="dt" idx="12"/>
           </p:nvPr>
         </p:nvSpPr>
         <p:spPr/>
@@ -7061,14 +7098,14 @@
           <a:bodyPr/>
           <a:lstStyle/>
           <a:p>
-            <a:fld id="{FCF63DAE-D37E-4C44-BD81-0E251F1BE300}" type="datetime1">
+            <a:fld id="{9F00D60D-1703-4D24-8308-FEE06A50A69C}" type="datetime1">
               <a:rPr lang="en-US" smtClean="0">
                 <a:solidFill>
                   <a:prstClr val="black"/>
                 </a:solidFill>
               </a:rPr>
               <a:pPr/>
-              <a:t>3/3/2017</a:t>
+              <a:t>8/7/2017</a:t>
             </a:fld>
             <a:endParaRPr lang="en-US" dirty="0">
               <a:solidFill>
@@ -7080,12 +7117,12 @@
       </p:sp>
       <p:sp>
         <p:nvSpPr>
-          <p:cNvPr id="6" name="Slide Number Placeholder 5"/>
-          <p:cNvSpPr>
-            <a:spLocks noGrp="1"/>
-          </p:cNvSpPr>
-          <p:nvPr>
-            <p:ph type="sldNum" sz="quarter" idx="12"/>
+          <p:cNvPr id="7" name="Slide Number Placeholder 6"/>
+          <p:cNvSpPr>
+            <a:spLocks noGrp="1"/>
+          </p:cNvSpPr>
+          <p:nvPr>
+            <p:ph type="sldNum" sz="quarter" idx="13"/>
           </p:nvPr>
         </p:nvSpPr>
         <p:spPr/>
@@ -7110,41 +7147,10 @@
           </a:p>
         </p:txBody>
       </p:sp>
-      <p:sp>
-        <p:nvSpPr>
-          <p:cNvPr id="7" name="Header Placeholder 6"/>
-          <p:cNvSpPr>
-            <a:spLocks noGrp="1"/>
-          </p:cNvSpPr>
-          <p:nvPr>
-            <p:ph type="hdr" sz="quarter" idx="13"/>
-          </p:nvPr>
-        </p:nvSpPr>
-        <p:spPr/>
-        <p:txBody>
-          <a:bodyPr/>
-          <a:lstStyle/>
-          <a:p>
-            <a:r>
-              <a:rPr lang="en-US">
-                <a:solidFill>
-                  <a:prstClr val="black"/>
-                </a:solidFill>
-              </a:rPr>
-              <a:t>Build 2014</a:t>
-            </a:r>
-            <a:endParaRPr lang="en-US" dirty="0">
-              <a:solidFill>
-                <a:prstClr val="black"/>
-              </a:solidFill>
-            </a:endParaRPr>
-          </a:p>
-        </p:txBody>
-      </p:sp>
     </p:spTree>
     <p:extLst>
       <p:ext uri="{BB962C8B-B14F-4D97-AF65-F5344CB8AC3E}">
-        <p14:creationId xmlns:p14="http://schemas.microsoft.com/office/powerpoint/2010/main" val="230311256"/>
+        <p14:creationId xmlns:p14="http://schemas.microsoft.com/office/powerpoint/2010/main" val="2882451625"/>
       </p:ext>
     </p:extLst>
   </p:cSld>
@@ -7204,43 +7210,12 @@
       </p:sp>
       <p:sp>
         <p:nvSpPr>
-          <p:cNvPr id="4" name="Header Placeholder 3"/>
-          <p:cNvSpPr>
-            <a:spLocks noGrp="1"/>
-          </p:cNvSpPr>
-          <p:nvPr>
-            <p:ph type="hdr" sz="quarter" idx="10"/>
-          </p:nvPr>
-        </p:nvSpPr>
-        <p:spPr/>
-        <p:txBody>
-          <a:bodyPr/>
-          <a:lstStyle/>
-          <a:p>
-            <a:r>
-              <a:rPr lang="en-US">
-                <a:solidFill>
-                  <a:prstClr val="black"/>
-                </a:solidFill>
-              </a:rPr>
-              <a:t>Build 2014</a:t>
-            </a:r>
-            <a:endParaRPr lang="en-US" dirty="0">
-              <a:solidFill>
-                <a:prstClr val="black"/>
-              </a:solidFill>
-            </a:endParaRPr>
-          </a:p>
-        </p:txBody>
-      </p:sp>
-      <p:sp>
-        <p:nvSpPr>
-          <p:cNvPr id="5" name="Footer Placeholder 4"/>
-          <p:cNvSpPr>
-            <a:spLocks noGrp="1"/>
-          </p:cNvSpPr>
-          <p:nvPr>
-            <p:ph type="ftr" sz="quarter" idx="11"/>
+          <p:cNvPr id="4" name="Footer Placeholder 3"/>
+          <p:cNvSpPr>
+            <a:spLocks noGrp="1"/>
+          </p:cNvSpPr>
+          <p:nvPr>
+            <p:ph type="ftr" sz="quarter" idx="10"/>
           </p:nvPr>
         </p:nvSpPr>
         <p:spPr/>
@@ -7289,12 +7264,12 @@
       </p:sp>
       <p:sp>
         <p:nvSpPr>
-          <p:cNvPr id="6" name="Date Placeholder 5"/>
-          <p:cNvSpPr>
-            <a:spLocks noGrp="1"/>
-          </p:cNvSpPr>
-          <p:nvPr>
-            <p:ph type="dt" idx="12"/>
+          <p:cNvPr id="5" name="Date Placeholder 4"/>
+          <p:cNvSpPr>
+            <a:spLocks noGrp="1"/>
+          </p:cNvSpPr>
+          <p:nvPr>
+            <p:ph type="dt" idx="11"/>
           </p:nvPr>
         </p:nvSpPr>
         <p:spPr/>
@@ -7302,14 +7277,14 @@
           <a:bodyPr/>
           <a:lstStyle/>
           <a:p>
-            <a:fld id="{9F00D60D-1703-4D24-8308-FEE06A50A69C}" type="datetime1">
+            <a:fld id="{FCF63DAE-D37E-4C44-BD81-0E251F1BE300}" type="datetime1">
               <a:rPr lang="en-US" smtClean="0">
                 <a:solidFill>
                   <a:prstClr val="black"/>
                 </a:solidFill>
               </a:rPr>
               <a:pPr/>
-              <a:t>3/3/2017</a:t>
+              <a:t>8/7/2017</a:t>
             </a:fld>
             <a:endParaRPr lang="en-US" dirty="0">
               <a:solidFill>
@@ -7321,12 +7296,12 @@
       </p:sp>
       <p:sp>
         <p:nvSpPr>
-          <p:cNvPr id="7" name="Slide Number Placeholder 6"/>
-          <p:cNvSpPr>
-            <a:spLocks noGrp="1"/>
-          </p:cNvSpPr>
-          <p:nvPr>
-            <p:ph type="sldNum" sz="quarter" idx="13"/>
+          <p:cNvPr id="6" name="Slide Number Placeholder 5"/>
+          <p:cNvSpPr>
+            <a:spLocks noGrp="1"/>
+          </p:cNvSpPr>
+          <p:nvPr>
+            <p:ph type="sldNum" sz="quarter" idx="12"/>
           </p:nvPr>
         </p:nvSpPr>
         <p:spPr/>
@@ -7351,10 +7326,41 @@
           </a:p>
         </p:txBody>
       </p:sp>
+      <p:sp>
+        <p:nvSpPr>
+          <p:cNvPr id="7" name="Header Placeholder 6"/>
+          <p:cNvSpPr>
+            <a:spLocks noGrp="1"/>
+          </p:cNvSpPr>
+          <p:nvPr>
+            <p:ph type="hdr" sz="quarter" idx="13"/>
+          </p:nvPr>
+        </p:nvSpPr>
+        <p:spPr/>
+        <p:txBody>
+          <a:bodyPr/>
+          <a:lstStyle/>
+          <a:p>
+            <a:r>
+              <a:rPr lang="en-US">
+                <a:solidFill>
+                  <a:prstClr val="black"/>
+                </a:solidFill>
+              </a:rPr>
+              <a:t>Build 2014</a:t>
+            </a:r>
+            <a:endParaRPr lang="en-US" dirty="0">
+              <a:solidFill>
+                <a:prstClr val="black"/>
+              </a:solidFill>
+            </a:endParaRPr>
+          </a:p>
+        </p:txBody>
+      </p:sp>
     </p:spTree>
     <p:extLst>
       <p:ext uri="{BB962C8B-B14F-4D97-AF65-F5344CB8AC3E}">
-        <p14:creationId xmlns:p14="http://schemas.microsoft.com/office/powerpoint/2010/main" val="3133682360"/>
+        <p14:creationId xmlns:p14="http://schemas.microsoft.com/office/powerpoint/2010/main" val="230311256"/>
       </p:ext>
     </p:extLst>
   </p:cSld>
@@ -7519,7 +7525,7 @@
                 </a:solidFill>
               </a:rPr>
               <a:pPr/>
-              <a:t>3/3/2017</a:t>
+              <a:t>8/7/2017</a:t>
             </a:fld>
             <a:endParaRPr lang="en-US" dirty="0">
               <a:solidFill>
@@ -7564,7 +7570,7 @@
     </p:spTree>
     <p:extLst>
       <p:ext uri="{BB962C8B-B14F-4D97-AF65-F5344CB8AC3E}">
-        <p14:creationId xmlns:p14="http://schemas.microsoft.com/office/powerpoint/2010/main" val="3662995644"/>
+        <p14:creationId xmlns:p14="http://schemas.microsoft.com/office/powerpoint/2010/main" val="3133682360"/>
       </p:ext>
     </p:extLst>
   </p:cSld>
@@ -7729,7 +7735,7 @@
                 </a:solidFill>
               </a:rPr>
               <a:pPr/>
-              <a:t>3/3/2017</a:t>
+              <a:t>8/7/2017</a:t>
             </a:fld>
             <a:endParaRPr lang="en-US" dirty="0">
               <a:solidFill>
@@ -7774,7 +7780,7 @@
     </p:spTree>
     <p:extLst>
       <p:ext uri="{BB962C8B-B14F-4D97-AF65-F5344CB8AC3E}">
-        <p14:creationId xmlns:p14="http://schemas.microsoft.com/office/powerpoint/2010/main" val="2906120500"/>
+        <p14:creationId xmlns:p14="http://schemas.microsoft.com/office/powerpoint/2010/main" val="3662995644"/>
       </p:ext>
     </p:extLst>
   </p:cSld>
@@ -7834,12 +7840,43 @@
       </p:sp>
       <p:sp>
         <p:nvSpPr>
-          <p:cNvPr id="4" name="Footer Placeholder 3"/>
-          <p:cNvSpPr>
-            <a:spLocks noGrp="1"/>
-          </p:cNvSpPr>
-          <p:nvPr>
-            <p:ph type="ftr" sz="quarter" idx="10"/>
+          <p:cNvPr id="4" name="Header Placeholder 3"/>
+          <p:cNvSpPr>
+            <a:spLocks noGrp="1"/>
+          </p:cNvSpPr>
+          <p:nvPr>
+            <p:ph type="hdr" sz="quarter" idx="10"/>
+          </p:nvPr>
+        </p:nvSpPr>
+        <p:spPr/>
+        <p:txBody>
+          <a:bodyPr/>
+          <a:lstStyle/>
+          <a:p>
+            <a:r>
+              <a:rPr lang="en-US">
+                <a:solidFill>
+                  <a:prstClr val="black"/>
+                </a:solidFill>
+              </a:rPr>
+              <a:t>Build 2014</a:t>
+            </a:r>
+            <a:endParaRPr lang="en-US" dirty="0">
+              <a:solidFill>
+                <a:prstClr val="black"/>
+              </a:solidFill>
+            </a:endParaRPr>
+          </a:p>
+        </p:txBody>
+      </p:sp>
+      <p:sp>
+        <p:nvSpPr>
+          <p:cNvPr id="5" name="Footer Placeholder 4"/>
+          <p:cNvSpPr>
+            <a:spLocks noGrp="1"/>
+          </p:cNvSpPr>
+          <p:nvPr>
+            <p:ph type="ftr" sz="quarter" idx="11"/>
           </p:nvPr>
         </p:nvSpPr>
         <p:spPr/>
@@ -7888,12 +7925,12 @@
       </p:sp>
       <p:sp>
         <p:nvSpPr>
-          <p:cNvPr id="5" name="Date Placeholder 4"/>
-          <p:cNvSpPr>
-            <a:spLocks noGrp="1"/>
-          </p:cNvSpPr>
-          <p:nvPr>
-            <p:ph type="dt" idx="11"/>
+          <p:cNvPr id="6" name="Date Placeholder 5"/>
+          <p:cNvSpPr>
+            <a:spLocks noGrp="1"/>
+          </p:cNvSpPr>
+          <p:nvPr>
+            <p:ph type="dt" idx="12"/>
           </p:nvPr>
         </p:nvSpPr>
         <p:spPr/>
@@ -7901,14 +7938,14 @@
           <a:bodyPr/>
           <a:lstStyle/>
           <a:p>
-            <a:fld id="{FCF63DAE-D37E-4C44-BD81-0E251F1BE300}" type="datetime1">
+            <a:fld id="{9F00D60D-1703-4D24-8308-FEE06A50A69C}" type="datetime1">
               <a:rPr lang="en-US" smtClean="0">
                 <a:solidFill>
                   <a:prstClr val="black"/>
                 </a:solidFill>
               </a:rPr>
               <a:pPr/>
-              <a:t>3/3/2017</a:t>
+              <a:t>8/7/2017</a:t>
             </a:fld>
             <a:endParaRPr lang="en-US" dirty="0">
               <a:solidFill>
@@ -7920,12 +7957,12 @@
       </p:sp>
       <p:sp>
         <p:nvSpPr>
-          <p:cNvPr id="6" name="Slide Number Placeholder 5"/>
-          <p:cNvSpPr>
-            <a:spLocks noGrp="1"/>
-          </p:cNvSpPr>
-          <p:nvPr>
-            <p:ph type="sldNum" sz="quarter" idx="12"/>
+          <p:cNvPr id="7" name="Slide Number Placeholder 6"/>
+          <p:cNvSpPr>
+            <a:spLocks noGrp="1"/>
+          </p:cNvSpPr>
+          <p:nvPr>
+            <p:ph type="sldNum" sz="quarter" idx="13"/>
           </p:nvPr>
         </p:nvSpPr>
         <p:spPr/>
@@ -7950,41 +7987,10 @@
           </a:p>
         </p:txBody>
       </p:sp>
-      <p:sp>
-        <p:nvSpPr>
-          <p:cNvPr id="7" name="Header Placeholder 6"/>
-          <p:cNvSpPr>
-            <a:spLocks noGrp="1"/>
-          </p:cNvSpPr>
-          <p:nvPr>
-            <p:ph type="hdr" sz="quarter" idx="13"/>
-          </p:nvPr>
-        </p:nvSpPr>
-        <p:spPr/>
-        <p:txBody>
-          <a:bodyPr/>
-          <a:lstStyle/>
-          <a:p>
-            <a:r>
-              <a:rPr lang="en-US">
-                <a:solidFill>
-                  <a:prstClr val="black"/>
-                </a:solidFill>
-              </a:rPr>
-              <a:t>Build 2014</a:t>
-            </a:r>
-            <a:endParaRPr lang="en-US" dirty="0">
-              <a:solidFill>
-                <a:prstClr val="black"/>
-              </a:solidFill>
-            </a:endParaRPr>
-          </a:p>
-        </p:txBody>
-      </p:sp>
     </p:spTree>
     <p:extLst>
       <p:ext uri="{BB962C8B-B14F-4D97-AF65-F5344CB8AC3E}">
-        <p14:creationId xmlns:p14="http://schemas.microsoft.com/office/powerpoint/2010/main" val="472659781"/>
+        <p14:creationId xmlns:p14="http://schemas.microsoft.com/office/powerpoint/2010/main" val="2906120500"/>
       </p:ext>
     </p:extLst>
   </p:cSld>
@@ -8044,43 +8050,12 @@
       </p:sp>
       <p:sp>
         <p:nvSpPr>
-          <p:cNvPr id="4" name="Header Placeholder 3"/>
-          <p:cNvSpPr>
-            <a:spLocks noGrp="1"/>
-          </p:cNvSpPr>
-          <p:nvPr>
-            <p:ph type="hdr" sz="quarter" idx="10"/>
-          </p:nvPr>
-        </p:nvSpPr>
-        <p:spPr/>
-        <p:txBody>
-          <a:bodyPr/>
-          <a:lstStyle/>
-          <a:p>
-            <a:r>
-              <a:rPr lang="en-US">
-                <a:solidFill>
-                  <a:prstClr val="black"/>
-                </a:solidFill>
-              </a:rPr>
-              <a:t>Build 2014</a:t>
-            </a:r>
-            <a:endParaRPr lang="en-US" dirty="0">
-              <a:solidFill>
-                <a:prstClr val="black"/>
-              </a:solidFill>
-            </a:endParaRPr>
-          </a:p>
-        </p:txBody>
-      </p:sp>
-      <p:sp>
-        <p:nvSpPr>
-          <p:cNvPr id="5" name="Footer Placeholder 4"/>
-          <p:cNvSpPr>
-            <a:spLocks noGrp="1"/>
-          </p:cNvSpPr>
-          <p:nvPr>
-            <p:ph type="ftr" sz="quarter" idx="11"/>
+          <p:cNvPr id="4" name="Footer Placeholder 3"/>
+          <p:cNvSpPr>
+            <a:spLocks noGrp="1"/>
+          </p:cNvSpPr>
+          <p:nvPr>
+            <p:ph type="ftr" sz="quarter" idx="10"/>
           </p:nvPr>
         </p:nvSpPr>
         <p:spPr/>
@@ -8129,12 +8104,12 @@
       </p:sp>
       <p:sp>
         <p:nvSpPr>
-          <p:cNvPr id="6" name="Date Placeholder 5"/>
-          <p:cNvSpPr>
-            <a:spLocks noGrp="1"/>
-          </p:cNvSpPr>
-          <p:nvPr>
-            <p:ph type="dt" idx="12"/>
+          <p:cNvPr id="5" name="Date Placeholder 4"/>
+          <p:cNvSpPr>
+            <a:spLocks noGrp="1"/>
+          </p:cNvSpPr>
+          <p:nvPr>
+            <p:ph type="dt" idx="11"/>
           </p:nvPr>
         </p:nvSpPr>
         <p:spPr/>
@@ -8142,14 +8117,14 @@
           <a:bodyPr/>
           <a:lstStyle/>
           <a:p>
-            <a:fld id="{9F00D60D-1703-4D24-8308-FEE06A50A69C}" type="datetime1">
+            <a:fld id="{FCF63DAE-D37E-4C44-BD81-0E251F1BE300}" type="datetime1">
               <a:rPr lang="en-US" smtClean="0">
                 <a:solidFill>
                   <a:prstClr val="black"/>
                 </a:solidFill>
               </a:rPr>
               <a:pPr/>
-              <a:t>3/3/2017</a:t>
+              <a:t>8/7/2017</a:t>
             </a:fld>
             <a:endParaRPr lang="en-US" dirty="0">
               <a:solidFill>
@@ -8161,12 +8136,12 @@
       </p:sp>
       <p:sp>
         <p:nvSpPr>
-          <p:cNvPr id="7" name="Slide Number Placeholder 6"/>
-          <p:cNvSpPr>
-            <a:spLocks noGrp="1"/>
-          </p:cNvSpPr>
-          <p:nvPr>
-            <p:ph type="sldNum" sz="quarter" idx="13"/>
+          <p:cNvPr id="6" name="Slide Number Placeholder 5"/>
+          <p:cNvSpPr>
+            <a:spLocks noGrp="1"/>
+          </p:cNvSpPr>
+          <p:nvPr>
+            <p:ph type="sldNum" sz="quarter" idx="12"/>
           </p:nvPr>
         </p:nvSpPr>
         <p:spPr/>
@@ -8191,10 +8166,41 @@
           </a:p>
         </p:txBody>
       </p:sp>
+      <p:sp>
+        <p:nvSpPr>
+          <p:cNvPr id="7" name="Header Placeholder 6"/>
+          <p:cNvSpPr>
+            <a:spLocks noGrp="1"/>
+          </p:cNvSpPr>
+          <p:nvPr>
+            <p:ph type="hdr" sz="quarter" idx="13"/>
+          </p:nvPr>
+        </p:nvSpPr>
+        <p:spPr/>
+        <p:txBody>
+          <a:bodyPr/>
+          <a:lstStyle/>
+          <a:p>
+            <a:r>
+              <a:rPr lang="en-US">
+                <a:solidFill>
+                  <a:prstClr val="black"/>
+                </a:solidFill>
+              </a:rPr>
+              <a:t>Build 2014</a:t>
+            </a:r>
+            <a:endParaRPr lang="en-US" dirty="0">
+              <a:solidFill>
+                <a:prstClr val="black"/>
+              </a:solidFill>
+            </a:endParaRPr>
+          </a:p>
+        </p:txBody>
+      </p:sp>
     </p:spTree>
     <p:extLst>
       <p:ext uri="{BB962C8B-B14F-4D97-AF65-F5344CB8AC3E}">
-        <p14:creationId xmlns:p14="http://schemas.microsoft.com/office/powerpoint/2010/main" val="2639183544"/>
+        <p14:creationId xmlns:p14="http://schemas.microsoft.com/office/powerpoint/2010/main" val="472659781"/>
       </p:ext>
     </p:extLst>
   </p:cSld>
@@ -8359,7 +8365,7 @@
                 </a:solidFill>
               </a:rPr>
               <a:pPr/>
-              <a:t>3/3/2017</a:t>
+              <a:t>8/7/2017</a:t>
             </a:fld>
             <a:endParaRPr lang="en-US" dirty="0">
               <a:solidFill>
@@ -8464,12 +8470,43 @@
       </p:sp>
       <p:sp>
         <p:nvSpPr>
-          <p:cNvPr id="4" name="Footer Placeholder 3"/>
-          <p:cNvSpPr>
-            <a:spLocks noGrp="1"/>
-          </p:cNvSpPr>
-          <p:nvPr>
-            <p:ph type="ftr" sz="quarter" idx="10"/>
+          <p:cNvPr id="4" name="Header Placeholder 3"/>
+          <p:cNvSpPr>
+            <a:spLocks noGrp="1"/>
+          </p:cNvSpPr>
+          <p:nvPr>
+            <p:ph type="hdr" sz="quarter" idx="10"/>
+          </p:nvPr>
+        </p:nvSpPr>
+        <p:spPr/>
+        <p:txBody>
+          <a:bodyPr/>
+          <a:lstStyle/>
+          <a:p>
+            <a:r>
+              <a:rPr lang="en-US">
+                <a:solidFill>
+                  <a:prstClr val="black"/>
+                </a:solidFill>
+              </a:rPr>
+              <a:t>Build 2014</a:t>
+            </a:r>
+            <a:endParaRPr lang="en-US" dirty="0">
+              <a:solidFill>
+                <a:prstClr val="black"/>
+              </a:solidFill>
+            </a:endParaRPr>
+          </a:p>
+        </p:txBody>
+      </p:sp>
+      <p:sp>
+        <p:nvSpPr>
+          <p:cNvPr id="5" name="Footer Placeholder 4"/>
+          <p:cNvSpPr>
+            <a:spLocks noGrp="1"/>
+          </p:cNvSpPr>
+          <p:nvPr>
+            <p:ph type="ftr" sz="quarter" idx="11"/>
           </p:nvPr>
         </p:nvSpPr>
         <p:spPr/>
@@ -8518,12 +8555,12 @@
       </p:sp>
       <p:sp>
         <p:nvSpPr>
-          <p:cNvPr id="5" name="Date Placeholder 4"/>
-          <p:cNvSpPr>
-            <a:spLocks noGrp="1"/>
-          </p:cNvSpPr>
-          <p:nvPr>
-            <p:ph type="dt" idx="11"/>
+          <p:cNvPr id="6" name="Date Placeholder 5"/>
+          <p:cNvSpPr>
+            <a:spLocks noGrp="1"/>
+          </p:cNvSpPr>
+          <p:nvPr>
+            <p:ph type="dt" idx="12"/>
           </p:nvPr>
         </p:nvSpPr>
         <p:spPr/>
@@ -8531,14 +8568,14 @@
           <a:bodyPr/>
           <a:lstStyle/>
           <a:p>
-            <a:fld id="{FCF63DAE-D37E-4C44-BD81-0E251F1BE300}" type="datetime1">
+            <a:fld id="{9F00D60D-1703-4D24-8308-FEE06A50A69C}" type="datetime1">
               <a:rPr lang="en-US" smtClean="0">
                 <a:solidFill>
                   <a:prstClr val="black"/>
                 </a:solidFill>
               </a:rPr>
               <a:pPr/>
-              <a:t>3/3/2017</a:t>
+              <a:t>8/7/2017</a:t>
             </a:fld>
             <a:endParaRPr lang="en-US" dirty="0">
               <a:solidFill>
@@ -8550,12 +8587,12 @@
       </p:sp>
       <p:sp>
         <p:nvSpPr>
-          <p:cNvPr id="6" name="Slide Number Placeholder 5"/>
-          <p:cNvSpPr>
-            <a:spLocks noGrp="1"/>
-          </p:cNvSpPr>
-          <p:nvPr>
-            <p:ph type="sldNum" sz="quarter" idx="12"/>
+          <p:cNvPr id="7" name="Slide Number Placeholder 6"/>
+          <p:cNvSpPr>
+            <a:spLocks noGrp="1"/>
+          </p:cNvSpPr>
+          <p:nvPr>
+            <p:ph type="sldNum" sz="quarter" idx="13"/>
           </p:nvPr>
         </p:nvSpPr>
         <p:spPr/>
@@ -8580,41 +8617,10 @@
           </a:p>
         </p:txBody>
       </p:sp>
-      <p:sp>
-        <p:nvSpPr>
-          <p:cNvPr id="7" name="Header Placeholder 6"/>
-          <p:cNvSpPr>
-            <a:spLocks noGrp="1"/>
-          </p:cNvSpPr>
-          <p:nvPr>
-            <p:ph type="hdr" sz="quarter" idx="13"/>
-          </p:nvPr>
-        </p:nvSpPr>
-        <p:spPr/>
-        <p:txBody>
-          <a:bodyPr/>
-          <a:lstStyle/>
-          <a:p>
-            <a:r>
-              <a:rPr lang="en-US">
-                <a:solidFill>
-                  <a:prstClr val="black"/>
-                </a:solidFill>
-              </a:rPr>
-              <a:t>Build 2014</a:t>
-            </a:r>
-            <a:endParaRPr lang="en-US" dirty="0">
-              <a:solidFill>
-                <a:prstClr val="black"/>
-              </a:solidFill>
-            </a:endParaRPr>
-          </a:p>
-        </p:txBody>
-      </p:sp>
     </p:spTree>
     <p:extLst>
       <p:ext uri="{BB962C8B-B14F-4D97-AF65-F5344CB8AC3E}">
-        <p14:creationId xmlns:p14="http://schemas.microsoft.com/office/powerpoint/2010/main" val="585965803"/>
+        <p14:creationId xmlns:p14="http://schemas.microsoft.com/office/powerpoint/2010/main" val="2639183544"/>
       </p:ext>
     </p:extLst>
   </p:cSld>
@@ -8674,43 +8680,12 @@
       </p:sp>
       <p:sp>
         <p:nvSpPr>
-          <p:cNvPr id="4" name="Header Placeholder 3"/>
-          <p:cNvSpPr>
-            <a:spLocks noGrp="1"/>
-          </p:cNvSpPr>
-          <p:nvPr>
-            <p:ph type="hdr" sz="quarter" idx="10"/>
-          </p:nvPr>
-        </p:nvSpPr>
-        <p:spPr/>
-        <p:txBody>
-          <a:bodyPr/>
-          <a:lstStyle/>
-          <a:p>
-            <a:r>
-              <a:rPr lang="en-US">
-                <a:solidFill>
-                  <a:prstClr val="black"/>
-                </a:solidFill>
-              </a:rPr>
-              <a:t>Build 2014</a:t>
-            </a:r>
-            <a:endParaRPr lang="en-US" dirty="0">
-              <a:solidFill>
-                <a:prstClr val="black"/>
-              </a:solidFill>
-            </a:endParaRPr>
-          </a:p>
-        </p:txBody>
-      </p:sp>
-      <p:sp>
-        <p:nvSpPr>
-          <p:cNvPr id="5" name="Footer Placeholder 4"/>
-          <p:cNvSpPr>
-            <a:spLocks noGrp="1"/>
-          </p:cNvSpPr>
-          <p:nvPr>
-            <p:ph type="ftr" sz="quarter" idx="11"/>
+          <p:cNvPr id="4" name="Footer Placeholder 3"/>
+          <p:cNvSpPr>
+            <a:spLocks noGrp="1"/>
+          </p:cNvSpPr>
+          <p:nvPr>
+            <p:ph type="ftr" sz="quarter" idx="10"/>
           </p:nvPr>
         </p:nvSpPr>
         <p:spPr/>
@@ -8759,12 +8734,12 @@
       </p:sp>
       <p:sp>
         <p:nvSpPr>
-          <p:cNvPr id="6" name="Date Placeholder 5"/>
-          <p:cNvSpPr>
-            <a:spLocks noGrp="1"/>
-          </p:cNvSpPr>
-          <p:nvPr>
-            <p:ph type="dt" idx="12"/>
+          <p:cNvPr id="5" name="Date Placeholder 4"/>
+          <p:cNvSpPr>
+            <a:spLocks noGrp="1"/>
+          </p:cNvSpPr>
+          <p:nvPr>
+            <p:ph type="dt" idx="11"/>
           </p:nvPr>
         </p:nvSpPr>
         <p:spPr/>
@@ -8772,14 +8747,14 @@
           <a:bodyPr/>
           <a:lstStyle/>
           <a:p>
-            <a:fld id="{9F00D60D-1703-4D24-8308-FEE06A50A69C}" type="datetime1">
+            <a:fld id="{FCF63DAE-D37E-4C44-BD81-0E251F1BE300}" type="datetime1">
               <a:rPr lang="en-US" smtClean="0">
                 <a:solidFill>
                   <a:prstClr val="black"/>
                 </a:solidFill>
               </a:rPr>
               <a:pPr/>
-              <a:t>3/3/2017</a:t>
+              <a:t>8/7/2017</a:t>
             </a:fld>
             <a:endParaRPr lang="en-US" dirty="0">
               <a:solidFill>
@@ -8791,12 +8766,12 @@
       </p:sp>
       <p:sp>
         <p:nvSpPr>
-          <p:cNvPr id="7" name="Slide Number Placeholder 6"/>
-          <p:cNvSpPr>
-            <a:spLocks noGrp="1"/>
-          </p:cNvSpPr>
-          <p:nvPr>
-            <p:ph type="sldNum" sz="quarter" idx="13"/>
+          <p:cNvPr id="6" name="Slide Number Placeholder 5"/>
+          <p:cNvSpPr>
+            <a:spLocks noGrp="1"/>
+          </p:cNvSpPr>
+          <p:nvPr>
+            <p:ph type="sldNum" sz="quarter" idx="12"/>
           </p:nvPr>
         </p:nvSpPr>
         <p:spPr/>
@@ -8812,6 +8787,247 @@
               </a:rPr>
               <a:pPr/>
               <a:t>44</a:t>
+            </a:fld>
+            <a:endParaRPr lang="en-US" dirty="0">
+              <a:solidFill>
+                <a:prstClr val="black"/>
+              </a:solidFill>
+            </a:endParaRPr>
+          </a:p>
+        </p:txBody>
+      </p:sp>
+      <p:sp>
+        <p:nvSpPr>
+          <p:cNvPr id="7" name="Header Placeholder 6"/>
+          <p:cNvSpPr>
+            <a:spLocks noGrp="1"/>
+          </p:cNvSpPr>
+          <p:nvPr>
+            <p:ph type="hdr" sz="quarter" idx="13"/>
+          </p:nvPr>
+        </p:nvSpPr>
+        <p:spPr/>
+        <p:txBody>
+          <a:bodyPr/>
+          <a:lstStyle/>
+          <a:p>
+            <a:r>
+              <a:rPr lang="en-US">
+                <a:solidFill>
+                  <a:prstClr val="black"/>
+                </a:solidFill>
+              </a:rPr>
+              <a:t>Build 2014</a:t>
+            </a:r>
+            <a:endParaRPr lang="en-US" dirty="0">
+              <a:solidFill>
+                <a:prstClr val="black"/>
+              </a:solidFill>
+            </a:endParaRPr>
+          </a:p>
+        </p:txBody>
+      </p:sp>
+    </p:spTree>
+    <p:extLst>
+      <p:ext uri="{BB962C8B-B14F-4D97-AF65-F5344CB8AC3E}">
+        <p14:creationId xmlns:p14="http://schemas.microsoft.com/office/powerpoint/2010/main" val="585965803"/>
+      </p:ext>
+    </p:extLst>
+  </p:cSld>
+  <p:clrMapOvr>
+    <a:masterClrMapping/>
+  </p:clrMapOvr>
+</p:notes>
+</file>
+
+<file path=ppt/notesSlides/notesSlide42.xml><?xml version="1.0" encoding="utf-8"?>
+<p:notes xmlns:a="http://schemas.openxmlformats.org/drawingml/2006/main" xmlns:r="http://schemas.openxmlformats.org/officeDocument/2006/relationships" xmlns:p="http://schemas.openxmlformats.org/presentationml/2006/main">
+  <p:cSld>
+    <p:spTree>
+      <p:nvGrpSpPr>
+        <p:cNvPr id="1" name=""/>
+        <p:cNvGrpSpPr/>
+        <p:nvPr/>
+      </p:nvGrpSpPr>
+      <p:grpSpPr>
+        <a:xfrm>
+          <a:off x="0" y="0"/>
+          <a:ext cx="0" cy="0"/>
+          <a:chOff x="0" y="0"/>
+          <a:chExt cx="0" cy="0"/>
+        </a:xfrm>
+      </p:grpSpPr>
+      <p:sp>
+        <p:nvSpPr>
+          <p:cNvPr id="2" name="Slide Image Placeholder 1"/>
+          <p:cNvSpPr>
+            <a:spLocks noGrp="1" noRot="1" noChangeAspect="1"/>
+          </p:cNvSpPr>
+          <p:nvPr>
+            <p:ph type="sldImg"/>
+          </p:nvPr>
+        </p:nvSpPr>
+        <p:spPr/>
+      </p:sp>
+      <p:sp>
+        <p:nvSpPr>
+          <p:cNvPr id="3" name="Notes Placeholder 2"/>
+          <p:cNvSpPr>
+            <a:spLocks noGrp="1"/>
+          </p:cNvSpPr>
+          <p:nvPr>
+            <p:ph type="body" idx="1"/>
+          </p:nvPr>
+        </p:nvSpPr>
+        <p:spPr/>
+        <p:txBody>
+          <a:bodyPr/>
+          <a:lstStyle/>
+          <a:p>
+            <a:endParaRPr lang="en-US"/>
+          </a:p>
+        </p:txBody>
+      </p:sp>
+      <p:sp>
+        <p:nvSpPr>
+          <p:cNvPr id="4" name="Header Placeholder 3"/>
+          <p:cNvSpPr>
+            <a:spLocks noGrp="1"/>
+          </p:cNvSpPr>
+          <p:nvPr>
+            <p:ph type="hdr" sz="quarter" idx="10"/>
+          </p:nvPr>
+        </p:nvSpPr>
+        <p:spPr/>
+        <p:txBody>
+          <a:bodyPr/>
+          <a:lstStyle/>
+          <a:p>
+            <a:r>
+              <a:rPr lang="en-US">
+                <a:solidFill>
+                  <a:prstClr val="black"/>
+                </a:solidFill>
+              </a:rPr>
+              <a:t>Build 2014</a:t>
+            </a:r>
+            <a:endParaRPr lang="en-US" dirty="0">
+              <a:solidFill>
+                <a:prstClr val="black"/>
+              </a:solidFill>
+            </a:endParaRPr>
+          </a:p>
+        </p:txBody>
+      </p:sp>
+      <p:sp>
+        <p:nvSpPr>
+          <p:cNvPr id="5" name="Footer Placeholder 4"/>
+          <p:cNvSpPr>
+            <a:spLocks noGrp="1"/>
+          </p:cNvSpPr>
+          <p:nvPr>
+            <p:ph type="ftr" sz="quarter" idx="11"/>
+          </p:nvPr>
+        </p:nvSpPr>
+        <p:spPr/>
+        <p:txBody>
+          <a:bodyPr/>
+          <a:lstStyle/>
+          <a:p>
+            <a:pPr defTabSz="914099" eaLnBrk="0" hangingPunct="0"/>
+            <a:r>
+              <a:rPr lang="en-US" sz="400">
+                <a:gradFill>
+                  <a:gsLst>
+                    <a:gs pos="0">
+                      <a:prstClr val="black"/>
+                    </a:gs>
+                    <a:gs pos="100000">
+                      <a:prstClr val="black"/>
+                    </a:gs>
+                  </a:gsLst>
+                  <a:lin ang="5400000" scaled="0"/>
+                </a:gradFill>
+                <a:latin typeface="Segoe UI" pitchFamily="34" charset="0"/>
+                <a:ea typeface="Segoe UI" pitchFamily="34" charset="0"/>
+                <a:cs typeface="Segoe UI" pitchFamily="34" charset="0"/>
+              </a:rPr>
+              <a:t>© 2014 Microsoft Corporation. All rights reserved. Microsoft, Windows, and other product names are or may be registered trademarks and/or trademarks in the U.S. and/or other countries. The information herein is for informational purposes only and represents the current view of Microsoft Corporation as of the date of this presentation.  Because Microsoft must respond to changing market conditions, it should not be interpreted to be a commitment on the part of Microsoft, and Microsoft cannot guarantee the accuracy of any information provided after the date of this presentation.  MICROSOFT MAKES NO WARRANTIES, EXPRESS, IMPLIED OR STATUTORY, AS TO THE INFORMATION IN THIS PRESENTATION.</a:t>
+            </a:r>
+            <a:endParaRPr lang="en-US" sz="400" dirty="0">
+              <a:gradFill>
+                <a:gsLst>
+                  <a:gs pos="0">
+                    <a:prstClr val="black"/>
+                  </a:gs>
+                  <a:gs pos="100000">
+                    <a:prstClr val="black"/>
+                  </a:gs>
+                </a:gsLst>
+                <a:lin ang="5400000" scaled="0"/>
+              </a:gradFill>
+              <a:latin typeface="Segoe UI" pitchFamily="34" charset="0"/>
+              <a:ea typeface="Segoe UI" pitchFamily="34" charset="0"/>
+              <a:cs typeface="Segoe UI" pitchFamily="34" charset="0"/>
+            </a:endParaRPr>
+          </a:p>
+        </p:txBody>
+      </p:sp>
+      <p:sp>
+        <p:nvSpPr>
+          <p:cNvPr id="6" name="Date Placeholder 5"/>
+          <p:cNvSpPr>
+            <a:spLocks noGrp="1"/>
+          </p:cNvSpPr>
+          <p:nvPr>
+            <p:ph type="dt" idx="12"/>
+          </p:nvPr>
+        </p:nvSpPr>
+        <p:spPr/>
+        <p:txBody>
+          <a:bodyPr/>
+          <a:lstStyle/>
+          <a:p>
+            <a:fld id="{9F00D60D-1703-4D24-8308-FEE06A50A69C}" type="datetime1">
+              <a:rPr lang="en-US" smtClean="0">
+                <a:solidFill>
+                  <a:prstClr val="black"/>
+                </a:solidFill>
+              </a:rPr>
+              <a:pPr/>
+              <a:t>8/7/2017</a:t>
+            </a:fld>
+            <a:endParaRPr lang="en-US" dirty="0">
+              <a:solidFill>
+                <a:prstClr val="black"/>
+              </a:solidFill>
+            </a:endParaRPr>
+          </a:p>
+        </p:txBody>
+      </p:sp>
+      <p:sp>
+        <p:nvSpPr>
+          <p:cNvPr id="7" name="Slide Number Placeholder 6"/>
+          <p:cNvSpPr>
+            <a:spLocks noGrp="1"/>
+          </p:cNvSpPr>
+          <p:nvPr>
+            <p:ph type="sldNum" sz="quarter" idx="13"/>
+          </p:nvPr>
+        </p:nvSpPr>
+        <p:spPr/>
+        <p:txBody>
+          <a:bodyPr/>
+          <a:lstStyle/>
+          <a:p>
+            <a:fld id="{B4008EB6-D09E-4580-8CD6-DDB14511944F}" type="slidenum">
+              <a:rPr lang="en-US" smtClean="0">
+                <a:solidFill>
+                  <a:prstClr val="black"/>
+                </a:solidFill>
+              </a:rPr>
+              <a:pPr/>
+              <a:t>45</a:t>
             </a:fld>
             <a:endParaRPr lang="en-US" dirty="0">
               <a:solidFill>
@@ -8989,7 +9205,7 @@
                 </a:solidFill>
               </a:rPr>
               <a:pPr/>
-              <a:t>3/3/2017</a:t>
+              <a:t>8/7/2017</a:t>
             </a:fld>
             <a:endParaRPr lang="en-US" dirty="0">
               <a:solidFill>
@@ -9199,7 +9415,7 @@
                 </a:solidFill>
               </a:rPr>
               <a:pPr/>
-              <a:t>3/3/2017</a:t>
+              <a:t>8/7/2017</a:t>
             </a:fld>
             <a:endParaRPr lang="en-US" dirty="0">
               <a:solidFill>
@@ -9409,7 +9625,7 @@
                 </a:solidFill>
               </a:rPr>
               <a:pPr/>
-              <a:t>3/3/2017</a:t>
+              <a:t>8/7/2017</a:t>
             </a:fld>
             <a:endParaRPr lang="en-US" dirty="0">
               <a:solidFill>
@@ -9619,7 +9835,7 @@
                 </a:solidFill>
               </a:rPr>
               <a:pPr/>
-              <a:t>3/3/2017</a:t>
+              <a:t>8/7/2017</a:t>
             </a:fld>
             <a:endParaRPr lang="en-US" dirty="0">
               <a:solidFill>
@@ -9829,7 +10045,7 @@
                 </a:solidFill>
               </a:rPr>
               <a:pPr/>
-              <a:t>3/3/2017</a:t>
+              <a:t>8/7/2017</a:t>
             </a:fld>
             <a:endParaRPr lang="en-US" dirty="0">
               <a:solidFill>
@@ -24860,6 +25076,151 @@
         </p:nvSpPr>
         <p:spPr>
           <a:xfrm>
+            <a:off x="503237" y="1744662"/>
+            <a:ext cx="11122837" cy="3505200"/>
+          </a:xfrm>
+        </p:spPr>
+        <p:txBody>
+          <a:bodyPr/>
+          <a:lstStyle/>
+          <a:p>
+            <a:pPr marL="571500" indent="-571500">
+              <a:buFont typeface="Arial" panose="020B0604020202020204" pitchFamily="34" charset="0"/>
+              <a:buChar char="•"/>
+            </a:pPr>
+            <a:r>
+              <a:rPr lang="en-US" dirty="0"/>
+              <a:t>Admin can click </a:t>
+            </a:r>
+            <a:r>
+              <a:rPr lang="en-US" b="1" dirty="0"/>
+              <a:t>Clear Login Cache</a:t>
+            </a:r>
+            <a:r>
+              <a:rPr lang="en-US" dirty="0"/>
+              <a:t> button to reset a login cache.</a:t>
+            </a:r>
+          </a:p>
+          <a:p>
+            <a:pPr marL="571500" indent="-571500">
+              <a:buFont typeface="Arial" panose="020B0604020202020204" pitchFamily="34" charset="0"/>
+              <a:buChar char="•"/>
+            </a:pPr>
+            <a:endParaRPr lang="en-US" dirty="0"/>
+          </a:p>
+        </p:txBody>
+      </p:sp>
+      <p:sp>
+        <p:nvSpPr>
+          <p:cNvPr id="3" name="Title 2"/>
+          <p:cNvSpPr>
+            <a:spLocks noGrp="1"/>
+          </p:cNvSpPr>
+          <p:nvPr>
+            <p:ph type="title"/>
+          </p:nvPr>
+        </p:nvSpPr>
+        <p:spPr/>
+        <p:txBody>
+          <a:bodyPr/>
+          <a:lstStyle/>
+          <a:p>
+            <a:r>
+              <a:rPr lang="en-US" dirty="0"/>
+              <a:t>Admin Panel – </a:t>
+            </a:r>
+            <a:r>
+              <a:rPr lang="en-US" altLang="zh-CN" dirty="0"/>
+              <a:t>Clear Login Cache</a:t>
+            </a:r>
+            <a:endParaRPr lang="en-US" dirty="0"/>
+          </a:p>
+        </p:txBody>
+      </p:sp>
+      <p:pic>
+        <p:nvPicPr>
+          <p:cNvPr id="4" name="Picture 3">
+            <a:extLst>
+              <a:ext uri="{FF2B5EF4-FFF2-40B4-BE49-F238E27FC236}">
+                <a16:creationId xmlns:a16="http://schemas.microsoft.com/office/drawing/2014/main" id="{2A193D34-CB9E-48D8-A27B-56E645C93C7F}"/>
+              </a:ext>
+            </a:extLst>
+          </p:cNvPr>
+          <p:cNvPicPr>
+            <a:picLocks noChangeAspect="1"/>
+          </p:cNvPicPr>
+          <p:nvPr/>
+        </p:nvPicPr>
+        <p:blipFill>
+          <a:blip r:embed="rId3"/>
+          <a:stretch>
+            <a:fillRect/>
+          </a:stretch>
+        </p:blipFill>
+        <p:spPr>
+          <a:xfrm>
+            <a:off x="1189037" y="4259262"/>
+            <a:ext cx="8923809" cy="800000"/>
+          </a:xfrm>
+          <a:prstGeom prst="rect">
+            <a:avLst/>
+          </a:prstGeom>
+        </p:spPr>
+      </p:pic>
+    </p:spTree>
+    <p:extLst>
+      <p:ext uri="{BB962C8B-B14F-4D97-AF65-F5344CB8AC3E}">
+        <p14:creationId xmlns:p14="http://schemas.microsoft.com/office/powerpoint/2010/main" val="2846073434"/>
+      </p:ext>
+    </p:extLst>
+  </p:cSld>
+  <p:clrMapOvr>
+    <a:masterClrMapping/>
+  </p:clrMapOvr>
+  <mc:AlternateContent xmlns:mc="http://schemas.openxmlformats.org/markup-compatibility/2006" xmlns:p14="http://schemas.microsoft.com/office/powerpoint/2010/main">
+    <mc:Choice Requires="p14">
+      <p:transition spd="med" p14:dur="700">
+        <p:fade/>
+      </p:transition>
+    </mc:Choice>
+    <mc:Fallback xmlns="">
+      <p:transition spd="med">
+        <p:fade/>
+      </p:transition>
+    </mc:Fallback>
+  </mc:AlternateContent>
+</p:sld>
+</file>
+
+<file path=ppt/slides/slide14.xml><?xml version="1.0" encoding="utf-8"?>
+<p:sld xmlns:a="http://schemas.openxmlformats.org/drawingml/2006/main" xmlns:r="http://schemas.openxmlformats.org/officeDocument/2006/relationships" xmlns:p="http://schemas.openxmlformats.org/presentationml/2006/main">
+  <p:cSld>
+    <p:spTree>
+      <p:nvGrpSpPr>
+        <p:cNvPr id="1" name=""/>
+        <p:cNvGrpSpPr/>
+        <p:nvPr/>
+      </p:nvGrpSpPr>
+      <p:grpSpPr>
+        <a:xfrm>
+          <a:off x="0" y="0"/>
+          <a:ext cx="0" cy="0"/>
+          <a:chOff x="0" y="0"/>
+          <a:chExt cx="0" cy="0"/>
+        </a:xfrm>
+      </p:grpSpPr>
+      <p:sp>
+        <p:nvSpPr>
+          <p:cNvPr id="2" name="Text Placeholder 1"/>
+          <p:cNvSpPr>
+            <a:spLocks noGrp="1"/>
+          </p:cNvSpPr>
+          <p:nvPr>
+            <p:ph type="body" sz="quarter" idx="15"/>
+          </p:nvPr>
+        </p:nvSpPr>
+        <p:spPr>
+          <a:xfrm>
             <a:off x="427037" y="1668462"/>
             <a:ext cx="6093637" cy="3505200"/>
           </a:xfrm>
@@ -24956,7 +25317,7 @@
 </p:sld>
 </file>
 
-<file path=ppt/slides/slide14.xml><?xml version="1.0" encoding="utf-8"?>
+<file path=ppt/slides/slide15.xml><?xml version="1.0" encoding="utf-8"?>
 <p:sld xmlns:a="http://schemas.openxmlformats.org/drawingml/2006/main" xmlns:r="http://schemas.openxmlformats.org/officeDocument/2006/relationships" xmlns:p="http://schemas.openxmlformats.org/presentationml/2006/main">
   <p:cSld>
     <p:bg>
@@ -25028,7 +25389,7 @@
 </p:sld>
 </file>
 
-<file path=ppt/slides/slide15.xml><?xml version="1.0" encoding="utf-8"?>
+<file path=ppt/slides/slide16.xml><?xml version="1.0" encoding="utf-8"?>
 <p:sld xmlns:a="http://schemas.openxmlformats.org/drawingml/2006/main" xmlns:r="http://schemas.openxmlformats.org/officeDocument/2006/relationships" xmlns:p="http://schemas.openxmlformats.org/presentationml/2006/main">
   <p:cSld>
     <p:spTree>
@@ -25107,7 +25468,7 @@
 </p:sld>
 </file>
 
-<file path=ppt/slides/slide16.xml><?xml version="1.0" encoding="utf-8"?>
+<file path=ppt/slides/slide17.xml><?xml version="1.0" encoding="utf-8"?>
 <p:sld xmlns:a="http://schemas.openxmlformats.org/drawingml/2006/main" xmlns:r="http://schemas.openxmlformats.org/officeDocument/2006/relationships" xmlns:p="http://schemas.openxmlformats.org/presentationml/2006/main">
   <p:cSld>
     <p:spTree>
@@ -25300,7 +25661,7 @@
 </p:sld>
 </file>
 
-<file path=ppt/slides/slide17.xml><?xml version="1.0" encoding="utf-8"?>
+<file path=ppt/slides/slide18.xml><?xml version="1.0" encoding="utf-8"?>
 <p:sld xmlns:a="http://schemas.openxmlformats.org/drawingml/2006/main" xmlns:r="http://schemas.openxmlformats.org/officeDocument/2006/relationships" xmlns:p="http://schemas.openxmlformats.org/presentationml/2006/main">
   <p:cSld>
     <p:spTree>
@@ -25438,7 +25799,7 @@
 </p:sld>
 </file>
 
-<file path=ppt/slides/slide18.xml><?xml version="1.0" encoding="utf-8"?>
+<file path=ppt/slides/slide19.xml><?xml version="1.0" encoding="utf-8"?>
 <p:sld xmlns:a="http://schemas.openxmlformats.org/drawingml/2006/main" xmlns:r="http://schemas.openxmlformats.org/officeDocument/2006/relationships" xmlns:p="http://schemas.openxmlformats.org/presentationml/2006/main">
   <p:cSld>
     <p:spTree>
@@ -25554,125 +25915,6 @@
     <p:extLst>
       <p:ext uri="{BB962C8B-B14F-4D97-AF65-F5344CB8AC3E}">
         <p14:creationId xmlns:p14="http://schemas.microsoft.com/office/powerpoint/2010/main" val="3356712560"/>
-      </p:ext>
-    </p:extLst>
-  </p:cSld>
-  <p:clrMapOvr>
-    <a:masterClrMapping/>
-  </p:clrMapOvr>
-  <mc:AlternateContent xmlns:mc="http://schemas.openxmlformats.org/markup-compatibility/2006" xmlns:p14="http://schemas.microsoft.com/office/powerpoint/2010/main">
-    <mc:Choice Requires="p14">
-      <p:transition spd="med" p14:dur="700">
-        <p:fade/>
-      </p:transition>
-    </mc:Choice>
-    <mc:Fallback xmlns="">
-      <p:transition spd="med">
-        <p:fade/>
-      </p:transition>
-    </mc:Fallback>
-  </mc:AlternateContent>
-</p:sld>
-</file>
-
-<file path=ppt/slides/slide19.xml><?xml version="1.0" encoding="utf-8"?>
-<p:sld xmlns:a="http://schemas.openxmlformats.org/drawingml/2006/main" xmlns:r="http://schemas.openxmlformats.org/officeDocument/2006/relationships" xmlns:p="http://schemas.openxmlformats.org/presentationml/2006/main">
-  <p:cSld>
-    <p:spTree>
-      <p:nvGrpSpPr>
-        <p:cNvPr id="1" name=""/>
-        <p:cNvGrpSpPr/>
-        <p:nvPr/>
-      </p:nvGrpSpPr>
-      <p:grpSpPr>
-        <a:xfrm>
-          <a:off x="0" y="0"/>
-          <a:ext cx="0" cy="0"/>
-          <a:chOff x="0" y="0"/>
-          <a:chExt cx="0" cy="0"/>
-        </a:xfrm>
-      </p:grpSpPr>
-      <p:sp>
-        <p:nvSpPr>
-          <p:cNvPr id="2" name="Text Placeholder 1"/>
-          <p:cNvSpPr>
-            <a:spLocks noGrp="1"/>
-          </p:cNvSpPr>
-          <p:nvPr>
-            <p:ph type="body" sz="quarter" idx="15"/>
-          </p:nvPr>
-        </p:nvSpPr>
-        <p:spPr>
-          <a:xfrm>
-            <a:off x="5303837" y="1919604"/>
-            <a:ext cx="7315203" cy="914400"/>
-          </a:xfrm>
-        </p:spPr>
-        <p:txBody>
-          <a:bodyPr/>
-          <a:lstStyle/>
-          <a:p>
-            <a:pPr marL="571500" indent="-571500">
-              <a:buFont typeface="Arial" panose="020B0604020202020204" pitchFamily="34" charset="0"/>
-              <a:buChar char="•"/>
-            </a:pPr>
-            <a:r>
-              <a:rPr lang="en-US" dirty="0"/>
-              <a:t>After linking the accounts succeeds the app displays all schools. </a:t>
-            </a:r>
-          </a:p>
-        </p:txBody>
-      </p:sp>
-      <p:sp>
-        <p:nvSpPr>
-          <p:cNvPr id="3" name="Title 2"/>
-          <p:cNvSpPr>
-            <a:spLocks noGrp="1"/>
-          </p:cNvSpPr>
-          <p:nvPr>
-            <p:ph type="title"/>
-          </p:nvPr>
-        </p:nvSpPr>
-        <p:spPr/>
-        <p:txBody>
-          <a:bodyPr/>
-          <a:lstStyle/>
-          <a:p>
-            <a:r>
-              <a:rPr lang="en-US" dirty="0"/>
-              <a:t>Login succeeded</a:t>
-            </a:r>
-          </a:p>
-        </p:txBody>
-      </p:sp>
-      <p:pic>
-        <p:nvPicPr>
-          <p:cNvPr id="4" name="Picture 3"/>
-          <p:cNvPicPr>
-            <a:picLocks noChangeAspect="1"/>
-          </p:cNvPicPr>
-          <p:nvPr/>
-        </p:nvPicPr>
-        <p:blipFill>
-          <a:blip r:embed="rId3"/>
-          <a:stretch>
-            <a:fillRect/>
-          </a:stretch>
-        </p:blipFill>
-        <p:spPr>
-          <a:xfrm>
-            <a:off x="503237" y="1744662"/>
-            <a:ext cx="4942189" cy="2453958"/>
-          </a:xfrm>
-          <a:prstGeom prst="rect">
-            <a:avLst/>
-          </a:prstGeom>
-        </p:spPr>
-      </p:pic>
-    </p:spTree>
-    <p:extLst>
-      <p:ext uri="{BB962C8B-B14F-4D97-AF65-F5344CB8AC3E}">
-        <p14:creationId xmlns:p14="http://schemas.microsoft.com/office/powerpoint/2010/main" val="2987509157"/>
       </p:ext>
     </p:extLst>
   </p:cSld>
@@ -25898,6 +26140,125 @@
       </p:grpSpPr>
       <p:sp>
         <p:nvSpPr>
+          <p:cNvPr id="2" name="Text Placeholder 1"/>
+          <p:cNvSpPr>
+            <a:spLocks noGrp="1"/>
+          </p:cNvSpPr>
+          <p:nvPr>
+            <p:ph type="body" sz="quarter" idx="15"/>
+          </p:nvPr>
+        </p:nvSpPr>
+        <p:spPr>
+          <a:xfrm>
+            <a:off x="5303837" y="1919604"/>
+            <a:ext cx="7315203" cy="914400"/>
+          </a:xfrm>
+        </p:spPr>
+        <p:txBody>
+          <a:bodyPr/>
+          <a:lstStyle/>
+          <a:p>
+            <a:pPr marL="571500" indent="-571500">
+              <a:buFont typeface="Arial" panose="020B0604020202020204" pitchFamily="34" charset="0"/>
+              <a:buChar char="•"/>
+            </a:pPr>
+            <a:r>
+              <a:rPr lang="en-US" dirty="0"/>
+              <a:t>After linking the accounts succeeds the app displays all schools. </a:t>
+            </a:r>
+          </a:p>
+        </p:txBody>
+      </p:sp>
+      <p:sp>
+        <p:nvSpPr>
+          <p:cNvPr id="3" name="Title 2"/>
+          <p:cNvSpPr>
+            <a:spLocks noGrp="1"/>
+          </p:cNvSpPr>
+          <p:nvPr>
+            <p:ph type="title"/>
+          </p:nvPr>
+        </p:nvSpPr>
+        <p:spPr/>
+        <p:txBody>
+          <a:bodyPr/>
+          <a:lstStyle/>
+          <a:p>
+            <a:r>
+              <a:rPr lang="en-US" dirty="0"/>
+              <a:t>Login succeeded</a:t>
+            </a:r>
+          </a:p>
+        </p:txBody>
+      </p:sp>
+      <p:pic>
+        <p:nvPicPr>
+          <p:cNvPr id="4" name="Picture 3"/>
+          <p:cNvPicPr>
+            <a:picLocks noChangeAspect="1"/>
+          </p:cNvPicPr>
+          <p:nvPr/>
+        </p:nvPicPr>
+        <p:blipFill>
+          <a:blip r:embed="rId3"/>
+          <a:stretch>
+            <a:fillRect/>
+          </a:stretch>
+        </p:blipFill>
+        <p:spPr>
+          <a:xfrm>
+            <a:off x="503237" y="1744662"/>
+            <a:ext cx="4942189" cy="2453958"/>
+          </a:xfrm>
+          <a:prstGeom prst="rect">
+            <a:avLst/>
+          </a:prstGeom>
+        </p:spPr>
+      </p:pic>
+    </p:spTree>
+    <p:extLst>
+      <p:ext uri="{BB962C8B-B14F-4D97-AF65-F5344CB8AC3E}">
+        <p14:creationId xmlns:p14="http://schemas.microsoft.com/office/powerpoint/2010/main" val="2987509157"/>
+      </p:ext>
+    </p:extLst>
+  </p:cSld>
+  <p:clrMapOvr>
+    <a:masterClrMapping/>
+  </p:clrMapOvr>
+  <mc:AlternateContent xmlns:mc="http://schemas.openxmlformats.org/markup-compatibility/2006" xmlns:p14="http://schemas.microsoft.com/office/powerpoint/2010/main">
+    <mc:Choice Requires="p14">
+      <p:transition spd="med" p14:dur="700">
+        <p:fade/>
+      </p:transition>
+    </mc:Choice>
+    <mc:Fallback xmlns="">
+      <p:transition spd="med">
+        <p:fade/>
+      </p:transition>
+    </mc:Fallback>
+  </mc:AlternateContent>
+</p:sld>
+</file>
+
+<file path=ppt/slides/slide21.xml><?xml version="1.0" encoding="utf-8"?>
+<p:sld xmlns:a="http://schemas.openxmlformats.org/drawingml/2006/main" xmlns:r="http://schemas.openxmlformats.org/officeDocument/2006/relationships" xmlns:p="http://schemas.openxmlformats.org/presentationml/2006/main">
+  <p:cSld>
+    <p:spTree>
+      <p:nvGrpSpPr>
+        <p:cNvPr id="1" name=""/>
+        <p:cNvGrpSpPr/>
+        <p:nvPr/>
+      </p:nvGrpSpPr>
+      <p:grpSpPr>
+        <a:xfrm>
+          <a:off x="0" y="0"/>
+          <a:ext cx="0" cy="0"/>
+          <a:chOff x="0" y="0"/>
+          <a:chExt cx="0" cy="0"/>
+        </a:xfrm>
+      </p:grpSpPr>
+      <p:sp>
+        <p:nvSpPr>
           <p:cNvPr id="3" name="Title 2"/>
           <p:cNvSpPr>
             <a:spLocks noGrp="1"/>
@@ -26040,7 +26401,7 @@
 </p:sld>
 </file>
 
-<file path=ppt/slides/slide21.xml><?xml version="1.0" encoding="utf-8"?>
+<file path=ppt/slides/slide22.xml><?xml version="1.0" encoding="utf-8"?>
 <p:sld xmlns:a="http://schemas.openxmlformats.org/drawingml/2006/main" xmlns:r="http://schemas.openxmlformats.org/officeDocument/2006/relationships" xmlns:p="http://schemas.openxmlformats.org/presentationml/2006/main">
   <p:cSld>
     <p:spTree>
@@ -26227,7 +26588,7 @@
 </p:sld>
 </file>
 
-<file path=ppt/slides/slide22.xml><?xml version="1.0" encoding="utf-8"?>
+<file path=ppt/slides/slide23.xml><?xml version="1.0" encoding="utf-8"?>
 <p:sld xmlns:a="http://schemas.openxmlformats.org/drawingml/2006/main" xmlns:r="http://schemas.openxmlformats.org/officeDocument/2006/relationships" xmlns:p="http://schemas.openxmlformats.org/presentationml/2006/main">
   <p:cSld>
     <p:spTree>
@@ -26348,7 +26709,7 @@
 </p:sld>
 </file>
 
-<file path=ppt/slides/slide23.xml><?xml version="1.0" encoding="utf-8"?>
+<file path=ppt/slides/slide24.xml><?xml version="1.0" encoding="utf-8"?>
 <p:sld xmlns:a="http://schemas.openxmlformats.org/drawingml/2006/main" xmlns:r="http://schemas.openxmlformats.org/officeDocument/2006/relationships" xmlns:p="http://schemas.openxmlformats.org/presentationml/2006/main">
   <p:cSld>
     <p:bg>
@@ -26420,7 +26781,7 @@
 </p:sld>
 </file>
 
-<file path=ppt/slides/slide24.xml><?xml version="1.0" encoding="utf-8"?>
+<file path=ppt/slides/slide25.xml><?xml version="1.0" encoding="utf-8"?>
 <p:sld xmlns:a="http://schemas.openxmlformats.org/drawingml/2006/main" xmlns:r="http://schemas.openxmlformats.org/officeDocument/2006/relationships" xmlns:p="http://schemas.openxmlformats.org/presentationml/2006/main">
   <p:cSld>
     <p:spTree>
@@ -26499,7 +26860,7 @@
 </p:sld>
 </file>
 
-<file path=ppt/slides/slide25.xml><?xml version="1.0" encoding="utf-8"?>
+<file path=ppt/slides/slide26.xml><?xml version="1.0" encoding="utf-8"?>
 <p:sld xmlns:a="http://schemas.openxmlformats.org/drawingml/2006/main" xmlns:r="http://schemas.openxmlformats.org/officeDocument/2006/relationships" xmlns:p="http://schemas.openxmlformats.org/presentationml/2006/main">
   <p:cSld>
     <p:spTree>
@@ -26637,7 +26998,7 @@
 </p:sld>
 </file>
 
-<file path=ppt/slides/slide26.xml><?xml version="1.0" encoding="utf-8"?>
+<file path=ppt/slides/slide27.xml><?xml version="1.0" encoding="utf-8"?>
 <p:sld xmlns:a="http://schemas.openxmlformats.org/drawingml/2006/main" xmlns:r="http://schemas.openxmlformats.org/officeDocument/2006/relationships" xmlns:p="http://schemas.openxmlformats.org/presentationml/2006/main">
   <p:cSld>
     <p:spTree>
@@ -26806,7 +27167,7 @@
 </p:sld>
 </file>
 
-<file path=ppt/slides/slide27.xml><?xml version="1.0" encoding="utf-8"?>
+<file path=ppt/slides/slide28.xml><?xml version="1.0" encoding="utf-8"?>
 <p:sld xmlns:a="http://schemas.openxmlformats.org/drawingml/2006/main" xmlns:r="http://schemas.openxmlformats.org/officeDocument/2006/relationships" xmlns:p="http://schemas.openxmlformats.org/presentationml/2006/main">
   <p:cSld>
     <p:spTree>
@@ -26938,7 +27299,7 @@
 </p:sld>
 </file>
 
-<file path=ppt/slides/slide28.xml><?xml version="1.0" encoding="utf-8"?>
+<file path=ppt/slides/slide29.xml><?xml version="1.0" encoding="utf-8"?>
 <p:sld xmlns:a="http://schemas.openxmlformats.org/drawingml/2006/main" xmlns:r="http://schemas.openxmlformats.org/officeDocument/2006/relationships" xmlns:p="http://schemas.openxmlformats.org/presentationml/2006/main">
   <p:cSld>
     <p:spTree>
@@ -27083,7 +27444,79 @@
 </p:sld>
 </file>
 
-<file path=ppt/slides/slide29.xml><?xml version="1.0" encoding="utf-8"?>
+<file path=ppt/slides/slide3.xml><?xml version="1.0" encoding="utf-8"?>
+<p:sld xmlns:a="http://schemas.openxmlformats.org/drawingml/2006/main" xmlns:r="http://schemas.openxmlformats.org/officeDocument/2006/relationships" xmlns:p="http://schemas.openxmlformats.org/presentationml/2006/main">
+  <p:cSld>
+    <p:bg>
+      <p:bgPr>
+        <a:solidFill>
+          <a:schemeClr val="bg2"/>
+        </a:solidFill>
+        <a:effectLst/>
+      </p:bgPr>
+    </p:bg>
+    <p:spTree>
+      <p:nvGrpSpPr>
+        <p:cNvPr id="1" name=""/>
+        <p:cNvGrpSpPr/>
+        <p:nvPr/>
+      </p:nvGrpSpPr>
+      <p:grpSpPr>
+        <a:xfrm>
+          <a:off x="0" y="0"/>
+          <a:ext cx="0" cy="0"/>
+          <a:chOff x="0" y="0"/>
+          <a:chExt cx="0" cy="0"/>
+        </a:xfrm>
+      </p:grpSpPr>
+      <p:sp>
+        <p:nvSpPr>
+          <p:cNvPr id="4" name="Title 3"/>
+          <p:cNvSpPr>
+            <a:spLocks noGrp="1"/>
+          </p:cNvSpPr>
+          <p:nvPr>
+            <p:ph type="title"/>
+          </p:nvPr>
+        </p:nvSpPr>
+        <p:spPr/>
+        <p:txBody>
+          <a:bodyPr/>
+          <a:lstStyle/>
+          <a:p>
+            <a:r>
+              <a:rPr lang="en-US" dirty="0"/>
+              <a:t>Admin Account Login Authentication Flow</a:t>
+            </a:r>
+          </a:p>
+        </p:txBody>
+      </p:sp>
+    </p:spTree>
+    <p:extLst>
+      <p:ext uri="{BB962C8B-B14F-4D97-AF65-F5344CB8AC3E}">
+        <p14:creationId xmlns:p14="http://schemas.microsoft.com/office/powerpoint/2010/main" val="141284340"/>
+      </p:ext>
+    </p:extLst>
+  </p:cSld>
+  <p:clrMapOvr>
+    <a:masterClrMapping/>
+  </p:clrMapOvr>
+  <mc:AlternateContent xmlns:mc="http://schemas.openxmlformats.org/markup-compatibility/2006" xmlns:p14="http://schemas.microsoft.com/office/powerpoint/2010/main">
+    <mc:Choice Requires="p14">
+      <p:transition spd="med" p14:dur="700">
+        <p:fade/>
+      </p:transition>
+    </mc:Choice>
+    <mc:Fallback xmlns="">
+      <p:transition spd="med">
+        <p:fade/>
+      </p:transition>
+    </mc:Fallback>
+  </mc:AlternateContent>
+</p:sld>
+</file>
+
+<file path=ppt/slides/slide30.xml><?xml version="1.0" encoding="utf-8"?>
 <p:sld xmlns:a="http://schemas.openxmlformats.org/drawingml/2006/main" xmlns:r="http://schemas.openxmlformats.org/officeDocument/2006/relationships" xmlns:p="http://schemas.openxmlformats.org/presentationml/2006/main">
   <p:cSld>
     <p:spTree>
@@ -27244,79 +27677,7 @@
 </p:sld>
 </file>
 
-<file path=ppt/slides/slide3.xml><?xml version="1.0" encoding="utf-8"?>
-<p:sld xmlns:a="http://schemas.openxmlformats.org/drawingml/2006/main" xmlns:r="http://schemas.openxmlformats.org/officeDocument/2006/relationships" xmlns:p="http://schemas.openxmlformats.org/presentationml/2006/main">
-  <p:cSld>
-    <p:bg>
-      <p:bgPr>
-        <a:solidFill>
-          <a:schemeClr val="bg2"/>
-        </a:solidFill>
-        <a:effectLst/>
-      </p:bgPr>
-    </p:bg>
-    <p:spTree>
-      <p:nvGrpSpPr>
-        <p:cNvPr id="1" name=""/>
-        <p:cNvGrpSpPr/>
-        <p:nvPr/>
-      </p:nvGrpSpPr>
-      <p:grpSpPr>
-        <a:xfrm>
-          <a:off x="0" y="0"/>
-          <a:ext cx="0" cy="0"/>
-          <a:chOff x="0" y="0"/>
-          <a:chExt cx="0" cy="0"/>
-        </a:xfrm>
-      </p:grpSpPr>
-      <p:sp>
-        <p:nvSpPr>
-          <p:cNvPr id="4" name="Title 3"/>
-          <p:cNvSpPr>
-            <a:spLocks noGrp="1"/>
-          </p:cNvSpPr>
-          <p:nvPr>
-            <p:ph type="title"/>
-          </p:nvPr>
-        </p:nvSpPr>
-        <p:spPr/>
-        <p:txBody>
-          <a:bodyPr/>
-          <a:lstStyle/>
-          <a:p>
-            <a:r>
-              <a:rPr lang="en-US" dirty="0"/>
-              <a:t>Admin Account Login Authentication Flow</a:t>
-            </a:r>
-          </a:p>
-        </p:txBody>
-      </p:sp>
-    </p:spTree>
-    <p:extLst>
-      <p:ext uri="{BB962C8B-B14F-4D97-AF65-F5344CB8AC3E}">
-        <p14:creationId xmlns:p14="http://schemas.microsoft.com/office/powerpoint/2010/main" val="141284340"/>
-      </p:ext>
-    </p:extLst>
-  </p:cSld>
-  <p:clrMapOvr>
-    <a:masterClrMapping/>
-  </p:clrMapOvr>
-  <mc:AlternateContent xmlns:mc="http://schemas.openxmlformats.org/markup-compatibility/2006" xmlns:p14="http://schemas.microsoft.com/office/powerpoint/2010/main">
-    <mc:Choice Requires="p14">
-      <p:transition spd="med" p14:dur="700">
-        <p:fade/>
-      </p:transition>
-    </mc:Choice>
-    <mc:Fallback xmlns="">
-      <p:transition spd="med">
-        <p:fade/>
-      </p:transition>
-    </mc:Fallback>
-  </mc:AlternateContent>
-</p:sld>
-</file>
-
-<file path=ppt/slides/slide30.xml><?xml version="1.0" encoding="utf-8"?>
+<file path=ppt/slides/slide31.xml><?xml version="1.0" encoding="utf-8"?>
 <p:sld xmlns:a="http://schemas.openxmlformats.org/drawingml/2006/main" xmlns:r="http://schemas.openxmlformats.org/officeDocument/2006/relationships" xmlns:p="http://schemas.openxmlformats.org/presentationml/2006/main">
   <p:cSld>
     <p:spTree>
@@ -27503,7 +27864,7 @@
 </p:sld>
 </file>
 
-<file path=ppt/slides/slide31.xml><?xml version="1.0" encoding="utf-8"?>
+<file path=ppt/slides/slide32.xml><?xml version="1.0" encoding="utf-8"?>
 <p:sld xmlns:a="http://schemas.openxmlformats.org/drawingml/2006/main" xmlns:r="http://schemas.openxmlformats.org/officeDocument/2006/relationships" xmlns:p="http://schemas.openxmlformats.org/presentationml/2006/main">
   <p:cSld>
     <p:spTree>
@@ -27624,7 +27985,7 @@
 </p:sld>
 </file>
 
-<file path=ppt/slides/slide32.xml><?xml version="1.0" encoding="utf-8"?>
+<file path=ppt/slides/slide33.xml><?xml version="1.0" encoding="utf-8"?>
 <p:sld xmlns:a="http://schemas.openxmlformats.org/drawingml/2006/main" xmlns:r="http://schemas.openxmlformats.org/officeDocument/2006/relationships" xmlns:p="http://schemas.openxmlformats.org/presentationml/2006/main">
   <p:cSld>
     <p:bg>
@@ -27696,7 +28057,7 @@
 </p:sld>
 </file>
 
-<file path=ppt/slides/slide33.xml><?xml version="1.0" encoding="utf-8"?>
+<file path=ppt/slides/slide34.xml><?xml version="1.0" encoding="utf-8"?>
 <p:sld xmlns:a="http://schemas.openxmlformats.org/drawingml/2006/main" xmlns:r="http://schemas.openxmlformats.org/officeDocument/2006/relationships" xmlns:p="http://schemas.openxmlformats.org/presentationml/2006/main">
   <p:cSld>
     <p:spTree>
@@ -27767,20 +28128,6 @@
           <a:p>
             <a:r>
               <a:rPr lang="en-US" sz="2800" dirty="0"/>
-              <a:t>Click the </a:t>
-            </a:r>
-            <a:r>
-              <a:rPr lang="en-US" sz="2800" b="1" dirty="0"/>
-              <a:t>Bing map icon </a:t>
-            </a:r>
-            <a:r>
-              <a:rPr lang="en-US" sz="2800" dirty="0"/>
-              <a:t>to show a map of the selected school. </a:t>
-            </a:r>
-          </a:p>
-          <a:p>
-            <a:r>
-              <a:rPr lang="en-US" sz="2800" dirty="0"/>
               <a:t>Click </a:t>
             </a:r>
             <a:r>
@@ -27818,7 +28165,13 @@
       </p:sp>
       <p:pic>
         <p:nvPicPr>
-          <p:cNvPr id="6" name="Picture 5"/>
+          <p:cNvPr id="4" name="Picture 3">
+            <a:extLst>
+              <a:ext uri="{FF2B5EF4-FFF2-40B4-BE49-F238E27FC236}">
+                <a16:creationId xmlns:a16="http://schemas.microsoft.com/office/drawing/2014/main" id="{24CE180C-8EA6-41DF-B235-126AFF042241}"/>
+              </a:ext>
+            </a:extLst>
+          </p:cNvPr>
           <p:cNvPicPr>
             <a:picLocks noChangeAspect="1"/>
           </p:cNvPicPr>
@@ -27832,8 +28185,8 @@
         </p:blipFill>
         <p:spPr>
           <a:xfrm>
-            <a:off x="1265237" y="4259262"/>
-            <a:ext cx="9047161" cy="2456691"/>
+            <a:off x="808037" y="3649662"/>
+            <a:ext cx="9158288" cy="3183111"/>
           </a:xfrm>
           <a:prstGeom prst="rect">
             <a:avLst/>
@@ -27865,7 +28218,7 @@
 </p:sld>
 </file>
 
-<file path=ppt/slides/slide34.xml><?xml version="1.0" encoding="utf-8"?>
+<file path=ppt/slides/slide35.xml><?xml version="1.0" encoding="utf-8"?>
 <p:sld xmlns:a="http://schemas.openxmlformats.org/drawingml/2006/main" xmlns:r="http://schemas.openxmlformats.org/officeDocument/2006/relationships" xmlns:p="http://schemas.openxmlformats.org/presentationml/2006/main">
   <p:cSld>
     <p:bg>
@@ -27937,7 +28290,7 @@
 </p:sld>
 </file>
 
-<file path=ppt/slides/slide35.xml><?xml version="1.0" encoding="utf-8"?>
+<file path=ppt/slides/slide36.xml><?xml version="1.0" encoding="utf-8"?>
 <p:sld xmlns:a="http://schemas.openxmlformats.org/drawingml/2006/main" xmlns:r="http://schemas.openxmlformats.org/officeDocument/2006/relationships" xmlns:p="http://schemas.openxmlformats.org/presentationml/2006/main">
   <p:cSld>
     <p:spTree>
@@ -28098,7 +28451,7 @@
 </p:sld>
 </file>
 
-<file path=ppt/slides/slide36.xml><?xml version="1.0" encoding="utf-8"?>
+<file path=ppt/slides/slide37.xml><?xml version="1.0" encoding="utf-8"?>
 <p:sld xmlns:a="http://schemas.openxmlformats.org/drawingml/2006/main" xmlns:r="http://schemas.openxmlformats.org/officeDocument/2006/relationships" xmlns:p="http://schemas.openxmlformats.org/presentationml/2006/main">
   <p:cSld>
     <p:spTree>
@@ -28217,7 +28570,7 @@
 </p:sld>
 </file>
 
-<file path=ppt/slides/slide37.xml><?xml version="1.0" encoding="utf-8"?>
+<file path=ppt/slides/slide38.xml><?xml version="1.0" encoding="utf-8"?>
 <p:sld xmlns:a="http://schemas.openxmlformats.org/drawingml/2006/main" xmlns:r="http://schemas.openxmlformats.org/officeDocument/2006/relationships" xmlns:p="http://schemas.openxmlformats.org/presentationml/2006/main">
   <p:cSld>
     <p:bg>
@@ -28289,7 +28642,7 @@
 </p:sld>
 </file>
 
-<file path=ppt/slides/slide38.xml><?xml version="1.0" encoding="utf-8"?>
+<file path=ppt/slides/slide39.xml><?xml version="1.0" encoding="utf-8"?>
 <p:sld xmlns:a="http://schemas.openxmlformats.org/drawingml/2006/main" xmlns:r="http://schemas.openxmlformats.org/officeDocument/2006/relationships" xmlns:p="http://schemas.openxmlformats.org/presentationml/2006/main">
   <p:cSld>
     <p:spTree>
@@ -28500,7 +28853,86 @@
 </p:sld>
 </file>
 
-<file path=ppt/slides/slide39.xml><?xml version="1.0" encoding="utf-8"?>
+<file path=ppt/slides/slide4.xml><?xml version="1.0" encoding="utf-8"?>
+<p:sld xmlns:a="http://schemas.openxmlformats.org/drawingml/2006/main" xmlns:r="http://schemas.openxmlformats.org/officeDocument/2006/relationships" xmlns:p="http://schemas.openxmlformats.org/presentationml/2006/main">
+  <p:cSld>
+    <p:spTree>
+      <p:nvGrpSpPr>
+        <p:cNvPr id="1" name=""/>
+        <p:cNvGrpSpPr/>
+        <p:nvPr/>
+      </p:nvGrpSpPr>
+      <p:grpSpPr>
+        <a:xfrm>
+          <a:off x="0" y="0"/>
+          <a:ext cx="0" cy="0"/>
+          <a:chOff x="0" y="0"/>
+          <a:chExt cx="0" cy="0"/>
+        </a:xfrm>
+      </p:grpSpPr>
+      <p:sp>
+        <p:nvSpPr>
+          <p:cNvPr id="3" name="Title 2"/>
+          <p:cNvSpPr>
+            <a:spLocks noGrp="1"/>
+          </p:cNvSpPr>
+          <p:nvPr>
+            <p:ph type="title"/>
+          </p:nvPr>
+        </p:nvSpPr>
+        <p:spPr/>
+        <p:txBody>
+          <a:bodyPr/>
+          <a:lstStyle/>
+          <a:p>
+            <a:r>
+              <a:rPr lang="en-US" dirty="0"/>
+              <a:t>Admin Account Login Authentication Flow</a:t>
+            </a:r>
+          </a:p>
+        </p:txBody>
+      </p:sp>
+      <p:pic>
+        <p:nvPicPr>
+          <p:cNvPr id="5" name="Picture 4"/>
+          <p:cNvPicPr>
+            <a:picLocks noChangeAspect="1"/>
+          </p:cNvPicPr>
+          <p:nvPr/>
+        </p:nvPicPr>
+        <p:blipFill>
+          <a:blip r:embed="rId2"/>
+          <a:stretch>
+            <a:fillRect/>
+          </a:stretch>
+        </p:blipFill>
+        <p:spPr>
+          <a:xfrm>
+            <a:off x="503236" y="1516062"/>
+            <a:ext cx="10783181" cy="4343400"/>
+          </a:xfrm>
+          <a:prstGeom prst="rect">
+            <a:avLst/>
+          </a:prstGeom>
+        </p:spPr>
+      </p:pic>
+    </p:spTree>
+    <p:extLst>
+      <p:ext uri="{BB962C8B-B14F-4D97-AF65-F5344CB8AC3E}">
+        <p14:creationId xmlns:p14="http://schemas.microsoft.com/office/powerpoint/2010/main" val="3169000962"/>
+      </p:ext>
+    </p:extLst>
+  </p:cSld>
+  <p:clrMapOvr>
+    <a:masterClrMapping/>
+  </p:clrMapOvr>
+  <p:transition>
+    <p:fade/>
+  </p:transition>
+</p:sld>
+</file>
+
+<file path=ppt/slides/slide40.xml><?xml version="1.0" encoding="utf-8"?>
 <p:sld xmlns:a="http://schemas.openxmlformats.org/drawingml/2006/main" xmlns:r="http://schemas.openxmlformats.org/officeDocument/2006/relationships" xmlns:p="http://schemas.openxmlformats.org/presentationml/2006/main">
   <p:cSld>
     <p:spTree>
@@ -28646,86 +29078,7 @@
 </p:sld>
 </file>
 
-<file path=ppt/slides/slide4.xml><?xml version="1.0" encoding="utf-8"?>
-<p:sld xmlns:a="http://schemas.openxmlformats.org/drawingml/2006/main" xmlns:r="http://schemas.openxmlformats.org/officeDocument/2006/relationships" xmlns:p="http://schemas.openxmlformats.org/presentationml/2006/main">
-  <p:cSld>
-    <p:spTree>
-      <p:nvGrpSpPr>
-        <p:cNvPr id="1" name=""/>
-        <p:cNvGrpSpPr/>
-        <p:nvPr/>
-      </p:nvGrpSpPr>
-      <p:grpSpPr>
-        <a:xfrm>
-          <a:off x="0" y="0"/>
-          <a:ext cx="0" cy="0"/>
-          <a:chOff x="0" y="0"/>
-          <a:chExt cx="0" cy="0"/>
-        </a:xfrm>
-      </p:grpSpPr>
-      <p:sp>
-        <p:nvSpPr>
-          <p:cNvPr id="3" name="Title 2"/>
-          <p:cNvSpPr>
-            <a:spLocks noGrp="1"/>
-          </p:cNvSpPr>
-          <p:nvPr>
-            <p:ph type="title"/>
-          </p:nvPr>
-        </p:nvSpPr>
-        <p:spPr/>
-        <p:txBody>
-          <a:bodyPr/>
-          <a:lstStyle/>
-          <a:p>
-            <a:r>
-              <a:rPr lang="en-US" dirty="0"/>
-              <a:t>Admin Account Login Authentication Flow</a:t>
-            </a:r>
-          </a:p>
-        </p:txBody>
-      </p:sp>
-      <p:pic>
-        <p:nvPicPr>
-          <p:cNvPr id="5" name="Picture 4"/>
-          <p:cNvPicPr>
-            <a:picLocks noChangeAspect="1"/>
-          </p:cNvPicPr>
-          <p:nvPr/>
-        </p:nvPicPr>
-        <p:blipFill>
-          <a:blip r:embed="rId2"/>
-          <a:stretch>
-            <a:fillRect/>
-          </a:stretch>
-        </p:blipFill>
-        <p:spPr>
-          <a:xfrm>
-            <a:off x="503236" y="1516062"/>
-            <a:ext cx="10783181" cy="4343400"/>
-          </a:xfrm>
-          <a:prstGeom prst="rect">
-            <a:avLst/>
-          </a:prstGeom>
-        </p:spPr>
-      </p:pic>
-    </p:spTree>
-    <p:extLst>
-      <p:ext uri="{BB962C8B-B14F-4D97-AF65-F5344CB8AC3E}">
-        <p14:creationId xmlns:p14="http://schemas.microsoft.com/office/powerpoint/2010/main" val="3169000962"/>
-      </p:ext>
-    </p:extLst>
-  </p:cSld>
-  <p:clrMapOvr>
-    <a:masterClrMapping/>
-  </p:clrMapOvr>
-  <p:transition>
-    <p:fade/>
-  </p:transition>
-</p:sld>
-</file>
-
-<file path=ppt/slides/slide40.xml><?xml version="1.0" encoding="utf-8"?>
+<file path=ppt/slides/slide41.xml><?xml version="1.0" encoding="utf-8"?>
 <p:sld xmlns:a="http://schemas.openxmlformats.org/drawingml/2006/main" xmlns:r="http://schemas.openxmlformats.org/officeDocument/2006/relationships" xmlns:p="http://schemas.openxmlformats.org/presentationml/2006/main">
   <p:cSld>
     <p:spTree>
@@ -28895,7 +29248,7 @@
 </p:sld>
 </file>
 
-<file path=ppt/slides/slide41.xml><?xml version="1.0" encoding="utf-8"?>
+<file path=ppt/slides/slide42.xml><?xml version="1.0" encoding="utf-8"?>
 <p:sld xmlns:a="http://schemas.openxmlformats.org/drawingml/2006/main" xmlns:r="http://schemas.openxmlformats.org/officeDocument/2006/relationships" xmlns:p="http://schemas.openxmlformats.org/presentationml/2006/main">
   <p:cSld>
     <p:bg>
@@ -28967,7 +29320,7 @@
 </p:sld>
 </file>
 
-<file path=ppt/slides/slide42.xml><?xml version="1.0" encoding="utf-8"?>
+<file path=ppt/slides/slide43.xml><?xml version="1.0" encoding="utf-8"?>
 <p:sld xmlns:a="http://schemas.openxmlformats.org/drawingml/2006/main" xmlns:r="http://schemas.openxmlformats.org/officeDocument/2006/relationships" xmlns:p="http://schemas.openxmlformats.org/presentationml/2006/main">
   <p:cSld>
     <p:spTree>
@@ -29108,7 +29461,7 @@
 </p:sld>
 </file>
 
-<file path=ppt/slides/slide43.xml><?xml version="1.0" encoding="utf-8"?>
+<file path=ppt/slides/slide44.xml><?xml version="1.0" encoding="utf-8"?>
 <p:sld xmlns:a="http://schemas.openxmlformats.org/drawingml/2006/main" xmlns:r="http://schemas.openxmlformats.org/officeDocument/2006/relationships" xmlns:p="http://schemas.openxmlformats.org/presentationml/2006/main">
   <p:cSld>
     <p:bg>
@@ -29180,7 +29533,7 @@
 </p:sld>
 </file>
 
-<file path=ppt/slides/slide44.xml><?xml version="1.0" encoding="utf-8"?>
+<file path=ppt/slides/slide45.xml><?xml version="1.0" encoding="utf-8"?>
 <p:sld xmlns:a="http://schemas.openxmlformats.org/drawingml/2006/main" xmlns:r="http://schemas.openxmlformats.org/officeDocument/2006/relationships" xmlns:p="http://schemas.openxmlformats.org/presentationml/2006/main">
   <p:cSld>
     <p:spTree>

</xml_diff>